<commit_message>
Aggiunto plot della matrice di confusione
</commit_message>
<xml_diff>
--- a/Presentazione.pptx
+++ b/Presentazione.pptx
@@ -1234,7 +1234,7 @@
           <a:p>
             <a:fld id="{4B667731-CB6E-4D20-A52C-F16264025886}" type="datetimeFigureOut">
               <a:rPr lang="it-IT" smtClean="0"/>
-              <a:t>02/04/2022</a:t>
+              <a:t>05/04/2022</a:t>
             </a:fld>
             <a:endParaRPr lang="it-IT"/>
           </a:p>
@@ -1412,7 +1412,7 @@
           <a:p>
             <a:fld id="{958F0A98-611F-4C09-BB46-AFE9EE9F6991}" type="datetimeFigureOut">
               <a:rPr lang="it-IT" noProof="0" smtClean="0"/>
-              <a:t>02/04/2022</a:t>
+              <a:t>05/04/2022</a:t>
             </a:fld>
             <a:endParaRPr lang="it-IT" noProof="0"/>
           </a:p>
@@ -3514,7 +3514,7 @@
             <a:pPr rtl="0"/>
             <a:fld id="{57B0FFBD-E1BC-406E-BD96-00B5FBEC9D3A}" type="datetime1">
               <a:rPr lang="it-IT" noProof="0" smtClean="0"/>
-              <a:t>02/04/2022</a:t>
+              <a:t>05/04/2022</a:t>
             </a:fld>
             <a:endParaRPr lang="it-IT" noProof="0"/>
           </a:p>
@@ -3804,7 +3804,7 @@
             <a:pPr rtl="0"/>
             <a:fld id="{829BF3C0-76B5-43F1-8FFA-90565AF7A6E5}" type="datetime1">
               <a:rPr lang="it-IT" noProof="0" smtClean="0"/>
-              <a:t>02/04/2022</a:t>
+              <a:t>05/04/2022</a:t>
             </a:fld>
             <a:endParaRPr lang="it-IT" noProof="0"/>
           </a:p>
@@ -4062,7 +4062,7 @@
             <a:pPr rtl="0"/>
             <a:fld id="{03B532AA-145D-47BE-822F-17D40912C6D9}" type="datetime1">
               <a:rPr lang="it-IT" noProof="0" smtClean="0"/>
-              <a:t>02/04/2022</a:t>
+              <a:t>05/04/2022</a:t>
             </a:fld>
             <a:endParaRPr lang="it-IT" noProof="0"/>
           </a:p>
@@ -4530,7 +4530,7 @@
             <a:pPr rtl="0"/>
             <a:fld id="{D38E090A-D4E0-4DB4-8F1D-3725BBDAE71E}" type="datetime1">
               <a:rPr lang="it-IT" noProof="0" smtClean="0"/>
-              <a:t>02/04/2022</a:t>
+              <a:t>05/04/2022</a:t>
             </a:fld>
             <a:endParaRPr lang="it-IT" noProof="0"/>
           </a:p>
@@ -4709,7 +4709,7 @@
             <a:pPr rtl="0"/>
             <a:fld id="{BCEA48FA-6B17-49E0-900B-FAD12608DC4F}" type="datetime1">
               <a:rPr lang="it-IT" noProof="0" smtClean="0"/>
-              <a:t>02/04/2022</a:t>
+              <a:t>05/04/2022</a:t>
             </a:fld>
             <a:endParaRPr lang="it-IT" noProof="0"/>
           </a:p>
@@ -5284,7 +5284,7 @@
             <a:pPr rtl="0"/>
             <a:fld id="{503CF22B-254E-460A-9603-CB7FA7937FE0}" type="datetime1">
               <a:rPr lang="it-IT" noProof="0" smtClean="0"/>
-              <a:t>02/04/2022</a:t>
+              <a:t>05/04/2022</a:t>
             </a:fld>
             <a:endParaRPr lang="it-IT" noProof="0"/>
           </a:p>
@@ -5614,7 +5614,7 @@
             <a:pPr rtl="0"/>
             <a:fld id="{764DFCD9-F6B5-45AE-BD02-88498CA14BAD}" type="datetime1">
               <a:rPr lang="it-IT" noProof="0" smtClean="0"/>
-              <a:t>02/04/2022</a:t>
+              <a:t>05/04/2022</a:t>
             </a:fld>
             <a:endParaRPr lang="it-IT" noProof="0"/>
           </a:p>
@@ -5787,7 +5787,7 @@
             <a:pPr rtl="0"/>
             <a:fld id="{1818985A-998D-417B-A07B-C56A8BE57D5C}" type="datetime1">
               <a:rPr lang="it-IT" noProof="0" smtClean="0"/>
-              <a:t>02/04/2022</a:t>
+              <a:t>05/04/2022</a:t>
             </a:fld>
             <a:endParaRPr lang="it-IT" noProof="0"/>
           </a:p>
@@ -5965,7 +5965,7 @@
             <a:pPr rtl="0"/>
             <a:fld id="{F5ED0816-B9EF-4A61-8007-865474D10EBA}" type="datetime1">
               <a:rPr lang="it-IT" noProof="0" smtClean="0"/>
-              <a:t>02/04/2022</a:t>
+              <a:t>05/04/2022</a:t>
             </a:fld>
             <a:endParaRPr lang="it-IT" noProof="0"/>
           </a:p>
@@ -6133,7 +6133,7 @@
             <a:pPr rtl="0"/>
             <a:fld id="{0723EAA3-D544-49EF-8F55-A751DF235442}" type="datetime1">
               <a:rPr lang="it-IT" noProof="0" smtClean="0"/>
-              <a:t>02/04/2022</a:t>
+              <a:t>05/04/2022</a:t>
             </a:fld>
             <a:endParaRPr lang="it-IT" noProof="0"/>
           </a:p>
@@ -6389,7 +6389,7 @@
             <a:pPr rtl="0"/>
             <a:fld id="{13A5D636-B530-41BE-AA00-8E473EA63152}" type="datetime1">
               <a:rPr lang="it-IT" noProof="0" smtClean="0"/>
-              <a:t>02/04/2022</a:t>
+              <a:t>05/04/2022</a:t>
             </a:fld>
             <a:endParaRPr lang="it-IT" noProof="0"/>
           </a:p>
@@ -6678,7 +6678,7 @@
             <a:pPr rtl="0"/>
             <a:fld id="{7E7EDC53-241B-4D60-A4B0-55225EE21EB0}" type="datetime1">
               <a:rPr lang="it-IT" noProof="0" smtClean="0"/>
-              <a:t>02/04/2022</a:t>
+              <a:t>05/04/2022</a:t>
             </a:fld>
             <a:endParaRPr lang="it-IT" noProof="0"/>
           </a:p>
@@ -7105,7 +7105,7 @@
             <a:pPr rtl="0"/>
             <a:fld id="{B42D9000-69A0-477F-8B29-20CB3BA50947}" type="datetime1">
               <a:rPr lang="it-IT" noProof="0" smtClean="0"/>
-              <a:t>02/04/2022</a:t>
+              <a:t>05/04/2022</a:t>
             </a:fld>
             <a:endParaRPr lang="it-IT" noProof="0"/>
           </a:p>
@@ -7222,7 +7222,7 @@
             <a:pPr rtl="0"/>
             <a:fld id="{36821639-A6BE-4571-B53D-69DB93B3E672}" type="datetime1">
               <a:rPr lang="it-IT" noProof="0" smtClean="0"/>
-              <a:t>02/04/2022</a:t>
+              <a:t>05/04/2022</a:t>
             </a:fld>
             <a:endParaRPr lang="it-IT" noProof="0"/>
           </a:p>
@@ -7316,7 +7316,7 @@
             <a:pPr rtl="0"/>
             <a:fld id="{FCE1A125-A460-4021-8D44-5D5F3005DC87}" type="datetime1">
               <a:rPr lang="it-IT" noProof="0" smtClean="0"/>
-              <a:t>02/04/2022</a:t>
+              <a:t>05/04/2022</a:t>
             </a:fld>
             <a:endParaRPr lang="it-IT" noProof="0"/>
           </a:p>
@@ -7597,7 +7597,7 @@
             <a:pPr rtl="0"/>
             <a:fld id="{07FE7ACD-F1B0-49DE-8C38-139A1FB9174D}" type="datetime1">
               <a:rPr lang="it-IT" noProof="0" smtClean="0"/>
-              <a:t>02/04/2022</a:t>
+              <a:t>05/04/2022</a:t>
             </a:fld>
             <a:endParaRPr lang="it-IT" noProof="0"/>
           </a:p>
@@ -7887,7 +7887,7 @@
             <a:pPr rtl="0"/>
             <a:fld id="{AFBF778C-B8FE-40FA-8157-9F604E8B4CEE}" type="datetime1">
               <a:rPr lang="it-IT" noProof="0" smtClean="0"/>
-              <a:t>02/04/2022</a:t>
+              <a:t>05/04/2022</a:t>
             </a:fld>
             <a:endParaRPr lang="it-IT" noProof="0"/>
           </a:p>
@@ -8116,7 +8116,7 @@
             <a:pPr rtl="0"/>
             <a:fld id="{0242243B-132F-42E2-B08A-6B670AF620C8}" type="datetime1">
               <a:rPr lang="it-IT" noProof="0" smtClean="0"/>
-              <a:t>02/04/2022</a:t>
+              <a:t>05/04/2022</a:t>
             </a:fld>
             <a:endParaRPr lang="it-IT" noProof="0"/>
           </a:p>
@@ -9004,7 +9004,7 @@
         </p:nvSpPr>
         <p:spPr>
           <a:xfrm>
-            <a:off x="5114260" y="1977656"/>
+            <a:off x="5114260" y="1848086"/>
             <a:ext cx="6858000" cy="4561367"/>
           </a:xfrm>
           <a:prstGeom prst="rect">
@@ -9052,7 +9052,12 @@
             <p:ph type="title"/>
           </p:nvPr>
         </p:nvSpPr>
-        <p:spPr/>
+        <p:spPr>
+          <a:xfrm>
+            <a:off x="1141413" y="-51598"/>
+            <a:ext cx="9905998" cy="1905000"/>
+          </a:xfrm>
+        </p:spPr>
         <p:txBody>
           <a:bodyPr/>
           <a:lstStyle/>
@@ -9083,7 +9088,7 @@
         </p:nvSpPr>
         <p:spPr>
           <a:xfrm>
-            <a:off x="767685" y="2060944"/>
+            <a:off x="613541" y="1505221"/>
             <a:ext cx="4249110" cy="3744433"/>
           </a:xfrm>
         </p:spPr>
@@ -9093,14 +9098,23 @@
           <a:p>
             <a:r>
               <a:rPr lang="it-IT" dirty="0"/>
-              <a:t>Percezione della voce umana</a:t>
+              <a:t>Scala mel (da Melodia) nata nel 1937 dallo psicofisico S.S. Stevens</a:t>
             </a:r>
           </a:p>
           <a:p>
             <a:r>
               <a:rPr lang="it-IT" dirty="0"/>
-              <a:t>Scala MEL</a:t>
-            </a:r>
+              <a:t>Valutazione basata sul pitch (altezza) del suono</a:t>
+            </a:r>
+          </a:p>
+          <a:p>
+            <a:r>
+              <a:rPr lang="it-IT" dirty="0"/>
+              <a:t>intento di rappresentare la percezione umana dei segnali sonori</a:t>
+            </a:r>
+          </a:p>
+          <a:p>
+            <a:endParaRPr lang="it-IT" dirty="0"/>
           </a:p>
         </p:txBody>
       </p:sp>
@@ -9170,6 +9184,36 @@
           </a:prstGeom>
         </p:spPr>
       </p:pic>
+      <p:pic>
+        <p:nvPicPr>
+          <p:cNvPr id="4" name="Immagine 3">
+            <a:extLst>
+              <a:ext uri="{FF2B5EF4-FFF2-40B4-BE49-F238E27FC236}">
+                <a16:creationId xmlns:a16="http://schemas.microsoft.com/office/drawing/2014/main" id="{8DAC9E1E-4FB6-4550-B53E-465D5EB728A9}"/>
+              </a:ext>
+            </a:extLst>
+          </p:cNvPr>
+          <p:cNvPicPr>
+            <a:picLocks noChangeAspect="1"/>
+          </p:cNvPicPr>
+          <p:nvPr/>
+        </p:nvPicPr>
+        <p:blipFill>
+          <a:blip r:embed="rId5"/>
+          <a:stretch>
+            <a:fillRect/>
+          </a:stretch>
+        </p:blipFill>
+        <p:spPr>
+          <a:xfrm>
+            <a:off x="330218" y="4690308"/>
+            <a:ext cx="4645820" cy="1935336"/>
+          </a:xfrm>
+          <a:prstGeom prst="rect">
+            <a:avLst/>
+          </a:prstGeom>
+        </p:spPr>
+      </p:pic>
     </p:spTree>
     <p:extLst>
       <p:ext uri="{BB962C8B-B14F-4D97-AF65-F5344CB8AC3E}">
@@ -9188,24 +9232,9 @@
   <p:cSld>
     <p:bg>
       <p:bgPr>
-        <a:blipFill rotWithShape="1">
-          <a:blip r:embed="rId2">
-            <a:duotone>
-              <a:schemeClr val="bg2">
-                <a:shade val="28000"/>
-                <a:satMod val="94000"/>
-                <a:lumMod val="20000"/>
-              </a:schemeClr>
-              <a:schemeClr val="bg2">
-                <a:tint val="94000"/>
-                <a:shade val="84000"/>
-                <a:satMod val="148000"/>
-                <a:lumMod val="114000"/>
-              </a:schemeClr>
-            </a:duotone>
-          </a:blip>
-          <a:stretch/>
-        </a:blipFill>
+        <a:solidFill>
+          <a:schemeClr val="bg1"/>
+        </a:solidFill>
         <a:effectLst/>
       </p:bgPr>
     </p:bg>
@@ -9225,6 +9254,66 @@
       </p:grpSpPr>
       <p:sp>
         <p:nvSpPr>
+          <p:cNvPr id="14" name="Rectangle 13">
+            <a:extLst>
+              <a:ext uri="{FF2B5EF4-FFF2-40B4-BE49-F238E27FC236}">
+                <a16:creationId xmlns:a16="http://schemas.microsoft.com/office/drawing/2014/main" id="{0EF8982E-02F0-4D24-85CB-98DEBCC3226A}"/>
+              </a:ext>
+              <a:ext uri="{C183D7F6-B498-43B3-948B-1728B52AA6E4}">
+                <adec:decorative xmlns:adec="http://schemas.microsoft.com/office/drawing/2017/decorative" val="1"/>
+              </a:ext>
+            </a:extLst>
+          </p:cNvPr>
+          <p:cNvSpPr>
+            <a:spLocks noGrp="1" noRot="1" noChangeAspect="1" noMove="1" noResize="1" noEditPoints="1" noAdjustHandles="1" noChangeArrowheads="1" noChangeShapeType="1" noTextEdit="1"/>
+          </p:cNvSpPr>
+          <p:nvPr>
+            <p:extLst>
+              <p:ext uri="{386F3935-93C4-4BCD-93E2-E3B085C9AB24}">
+                <p16:designElem xmlns:p16="http://schemas.microsoft.com/office/powerpoint/2015/main" val="1"/>
+              </p:ext>
+            </p:extLst>
+          </p:nvPr>
+        </p:nvSpPr>
+        <p:spPr>
+          <a:xfrm>
+            <a:off x="0" y="0"/>
+            <a:ext cx="12192000" cy="6858000"/>
+          </a:xfrm>
+          <a:prstGeom prst="rect">
+            <a:avLst/>
+          </a:prstGeom>
+          <a:ln>
+            <a:noFill/>
+          </a:ln>
+        </p:spPr>
+        <p:style>
+          <a:lnRef idx="2">
+            <a:schemeClr val="accent1">
+              <a:shade val="50000"/>
+            </a:schemeClr>
+          </a:lnRef>
+          <a:fillRef idx="1003">
+            <a:schemeClr val="dk2"/>
+          </a:fillRef>
+          <a:effectRef idx="0">
+            <a:schemeClr val="accent1"/>
+          </a:effectRef>
+          <a:fontRef idx="minor">
+            <a:schemeClr val="lt1"/>
+          </a:fontRef>
+        </p:style>
+        <p:txBody>
+          <a:bodyPr rtlCol="0" anchor="ctr"/>
+          <a:lstStyle/>
+          <a:p>
+            <a:pPr algn="ctr"/>
+            <a:endParaRPr lang="en-US"/>
+          </a:p>
+        </p:txBody>
+      </p:sp>
+      <p:sp>
+        <p:nvSpPr>
           <p:cNvPr id="2" name="Titolo 1">
             <a:extLst>
               <a:ext uri="{FF2B5EF4-FFF2-40B4-BE49-F238E27FC236}">
@@ -9242,7 +9331,7 @@
         <p:spPr>
           <a:xfrm>
             <a:off x="643192" y="609600"/>
-            <a:ext cx="3643674" cy="1905000"/>
+            <a:ext cx="3643674" cy="1867786"/>
           </a:xfrm>
         </p:spPr>
         <p:txBody>
@@ -9251,8 +9340,24 @@
           </a:bodyPr>
           <a:lstStyle/>
           <a:p>
-            <a:r>
-              <a:rPr lang="it-IT" sz="2800"/>
+            <a:pPr algn="ctr"/>
+            <a:r>
+              <a:rPr lang="it-IT" sz="2800" dirty="0">
+                <a:gradFill flip="none" rotWithShape="1">
+                  <a:gsLst>
+                    <a:gs pos="0">
+                      <a:sysClr val="window" lastClr="FFFFFF"/>
+                    </a:gs>
+                    <a:gs pos="100000">
+                      <a:sysClr val="window" lastClr="FFFFFF">
+                        <a:lumMod val="65000"/>
+                      </a:sysClr>
+                    </a:gs>
+                  </a:gsLst>
+                  <a:lin ang="5580000" scaled="0"/>
+                  <a:tileRect/>
+                </a:gradFill>
+              </a:rPr>
               <a:t>Processo di estrazione delle mfcc</a:t>
             </a:r>
           </a:p>
@@ -9276,8 +9381,8 @@
         </p:nvSpPr>
         <p:spPr>
           <a:xfrm>
-            <a:off x="643192" y="2666999"/>
-            <a:ext cx="3643674" cy="3216276"/>
+            <a:off x="643192" y="2666998"/>
+            <a:ext cx="3748056" cy="3581402"/>
           </a:xfrm>
         </p:spPr>
         <p:txBody>
@@ -9286,48 +9391,273 @@
           </a:bodyPr>
           <a:lstStyle/>
           <a:p>
-            <a:endParaRPr lang="en-US" sz="1800"/>
+            <a:pPr marL="342900" indent="-342900">
+              <a:buFont typeface="+mj-lt"/>
+              <a:buAutoNum type="arabicPeriod"/>
+            </a:pPr>
+            <a:r>
+              <a:rPr lang="en-US" sz="1800" dirty="0">
+                <a:gradFill flip="none" rotWithShape="1">
+                  <a:gsLst>
+                    <a:gs pos="0">
+                      <a:sysClr val="window" lastClr="FFFFFF"/>
+                    </a:gs>
+                    <a:gs pos="100000">
+                      <a:sysClr val="window" lastClr="FFFFFF">
+                        <a:lumMod val="75000"/>
+                      </a:sysClr>
+                    </a:gs>
+                  </a:gsLst>
+                  <a:lin ang="5580000" scaled="0"/>
+                  <a:tileRect/>
+                </a:gradFill>
+              </a:rPr>
+              <a:t>Pre-emphasis</a:t>
+            </a:r>
+          </a:p>
+          <a:p>
+            <a:pPr marL="342900" indent="-342900">
+              <a:buFont typeface="+mj-lt"/>
+              <a:buAutoNum type="arabicPeriod"/>
+            </a:pPr>
+            <a:r>
+              <a:rPr lang="en-US" sz="1800" dirty="0">
+                <a:gradFill flip="none" rotWithShape="1">
+                  <a:gsLst>
+                    <a:gs pos="0">
+                      <a:sysClr val="window" lastClr="FFFFFF"/>
+                    </a:gs>
+                    <a:gs pos="100000">
+                      <a:sysClr val="window" lastClr="FFFFFF">
+                        <a:lumMod val="75000"/>
+                      </a:sysClr>
+                    </a:gs>
+                  </a:gsLst>
+                  <a:lin ang="5580000" scaled="0"/>
+                  <a:tileRect/>
+                </a:gradFill>
+              </a:rPr>
+              <a:t>Frame blocking and windowing</a:t>
+            </a:r>
+          </a:p>
+          <a:p>
+            <a:pPr marL="342900" indent="-342900">
+              <a:buFont typeface="+mj-lt"/>
+              <a:buAutoNum type="arabicPeriod"/>
+            </a:pPr>
+            <a:r>
+              <a:rPr lang="it-IT" sz="1800" dirty="0">
+                <a:gradFill flip="none" rotWithShape="1">
+                  <a:gsLst>
+                    <a:gs pos="0">
+                      <a:sysClr val="window" lastClr="FFFFFF"/>
+                    </a:gs>
+                    <a:gs pos="100000">
+                      <a:sysClr val="window" lastClr="FFFFFF">
+                        <a:lumMod val="75000"/>
+                      </a:sysClr>
+                    </a:gs>
+                  </a:gsLst>
+                  <a:lin ang="5580000" scaled="0"/>
+                  <a:tileRect/>
+                </a:gradFill>
+              </a:rPr>
+              <a:t>DFT </a:t>
+            </a:r>
+            <a:r>
+              <a:rPr lang="it-IT" sz="1800" dirty="0" err="1">
+                <a:gradFill flip="none" rotWithShape="1">
+                  <a:gsLst>
+                    <a:gs pos="0">
+                      <a:sysClr val="window" lastClr="FFFFFF"/>
+                    </a:gs>
+                    <a:gs pos="100000">
+                      <a:sysClr val="window" lastClr="FFFFFF">
+                        <a:lumMod val="75000"/>
+                      </a:sysClr>
+                    </a:gs>
+                  </a:gsLst>
+                  <a:lin ang="5580000" scaled="0"/>
+                  <a:tileRect/>
+                </a:gradFill>
+              </a:rPr>
+              <a:t>spectrum</a:t>
+            </a:r>
+            <a:endParaRPr lang="it-IT" sz="1800" dirty="0">
+              <a:gradFill flip="none" rotWithShape="1">
+                <a:gsLst>
+                  <a:gs pos="0">
+                    <a:sysClr val="window" lastClr="FFFFFF"/>
+                  </a:gs>
+                  <a:gs pos="100000">
+                    <a:sysClr val="window" lastClr="FFFFFF">
+                      <a:lumMod val="75000"/>
+                    </a:sysClr>
+                  </a:gs>
+                </a:gsLst>
+                <a:lin ang="5580000" scaled="0"/>
+                <a:tileRect/>
+              </a:gradFill>
+            </a:endParaRPr>
+          </a:p>
+          <a:p>
+            <a:pPr marL="342900" indent="-342900">
+              <a:buFont typeface="+mj-lt"/>
+              <a:buAutoNum type="arabicPeriod"/>
+            </a:pPr>
+            <a:r>
+              <a:rPr lang="it-IT" sz="1800" dirty="0">
+                <a:gradFill flip="none" rotWithShape="1">
+                  <a:gsLst>
+                    <a:gs pos="0">
+                      <a:sysClr val="window" lastClr="FFFFFF"/>
+                    </a:gs>
+                    <a:gs pos="100000">
+                      <a:sysClr val="window" lastClr="FFFFFF">
+                        <a:lumMod val="75000"/>
+                      </a:sysClr>
+                    </a:gs>
+                  </a:gsLst>
+                  <a:lin ang="5580000" scaled="0"/>
+                  <a:tileRect/>
+                </a:gradFill>
+              </a:rPr>
+              <a:t>Mel </a:t>
+            </a:r>
+            <a:r>
+              <a:rPr lang="it-IT" sz="1800" dirty="0" err="1">
+                <a:gradFill flip="none" rotWithShape="1">
+                  <a:gsLst>
+                    <a:gs pos="0">
+                      <a:sysClr val="window" lastClr="FFFFFF"/>
+                    </a:gs>
+                    <a:gs pos="100000">
+                      <a:sysClr val="window" lastClr="FFFFFF">
+                        <a:lumMod val="75000"/>
+                      </a:sysClr>
+                    </a:gs>
+                  </a:gsLst>
+                  <a:lin ang="5580000" scaled="0"/>
+                  <a:tileRect/>
+                </a:gradFill>
+              </a:rPr>
+              <a:t>spectrum</a:t>
+            </a:r>
+            <a:endParaRPr lang="it-IT" sz="1800" dirty="0">
+              <a:gradFill flip="none" rotWithShape="1">
+                <a:gsLst>
+                  <a:gs pos="0">
+                    <a:sysClr val="window" lastClr="FFFFFF"/>
+                  </a:gs>
+                  <a:gs pos="100000">
+                    <a:sysClr val="window" lastClr="FFFFFF">
+                      <a:lumMod val="75000"/>
+                    </a:sysClr>
+                  </a:gs>
+                </a:gsLst>
+                <a:lin ang="5580000" scaled="0"/>
+                <a:tileRect/>
+              </a:gradFill>
+            </a:endParaRPr>
+          </a:p>
+          <a:p>
+            <a:pPr marL="342900" indent="-342900">
+              <a:buFont typeface="+mj-lt"/>
+              <a:buAutoNum type="arabicPeriod"/>
+            </a:pPr>
+            <a:r>
+              <a:rPr lang="it-IT" sz="1800" dirty="0">
+                <a:gradFill flip="none" rotWithShape="1">
+                  <a:gsLst>
+                    <a:gs pos="0">
+                      <a:sysClr val="window" lastClr="FFFFFF"/>
+                    </a:gs>
+                    <a:gs pos="100000">
+                      <a:sysClr val="window" lastClr="FFFFFF">
+                        <a:lumMod val="75000"/>
+                      </a:sysClr>
+                    </a:gs>
+                  </a:gsLst>
+                  <a:lin ang="5580000" scaled="0"/>
+                  <a:tileRect/>
+                </a:gradFill>
+              </a:rPr>
+              <a:t>delta </a:t>
+            </a:r>
+            <a:r>
+              <a:rPr lang="it-IT" sz="1800" dirty="0" err="1">
+                <a:gradFill flip="none" rotWithShape="1">
+                  <a:gsLst>
+                    <a:gs pos="0">
+                      <a:sysClr val="window" lastClr="FFFFFF"/>
+                    </a:gs>
+                    <a:gs pos="100000">
+                      <a:sysClr val="window" lastClr="FFFFFF">
+                        <a:lumMod val="75000"/>
+                      </a:sysClr>
+                    </a:gs>
+                  </a:gsLst>
+                  <a:lin ang="5580000" scaled="0"/>
+                  <a:tileRect/>
+                </a:gradFill>
+              </a:rPr>
+              <a:t>coefficients</a:t>
+            </a:r>
+            <a:endParaRPr lang="en-US" sz="1800" dirty="0">
+              <a:gradFill flip="none" rotWithShape="1">
+                <a:gsLst>
+                  <a:gs pos="0">
+                    <a:sysClr val="window" lastClr="FFFFFF"/>
+                  </a:gs>
+                  <a:gs pos="100000">
+                    <a:sysClr val="window" lastClr="FFFFFF">
+                      <a:lumMod val="75000"/>
+                    </a:sysClr>
+                  </a:gs>
+                </a:gsLst>
+                <a:lin ang="5580000" scaled="0"/>
+                <a:tileRect/>
+              </a:gradFill>
+            </a:endParaRPr>
           </a:p>
         </p:txBody>
       </p:sp>
-      <p:pic>
-        <p:nvPicPr>
-          <p:cNvPr id="3074" name="Picture 2" descr="How I Understood: What features to consider while training audio files? |  by Joel Jogy | Towards Data Science">
-            <a:hlinkClick r:id="rId3"/>
+      <p:sp>
+        <p:nvSpPr>
+          <p:cNvPr id="16" name="Rounded Rectangle 7">
             <a:extLst>
               <a:ext uri="{FF2B5EF4-FFF2-40B4-BE49-F238E27FC236}">
-                <a16:creationId xmlns:a16="http://schemas.microsoft.com/office/drawing/2014/main" id="{AA47A1A3-370F-4975-A210-A969CC1E2453}"/>
+                <a16:creationId xmlns:a16="http://schemas.microsoft.com/office/drawing/2014/main" id="{2CB72970-2D5B-4516-9F76-B1220A77B6AB}"/>
+              </a:ext>
+              <a:ext uri="{C183D7F6-B498-43B3-948B-1728B52AA6E4}">
+                <adec:decorative xmlns:adec="http://schemas.microsoft.com/office/drawing/2017/decorative" val="1"/>
               </a:ext>
             </a:extLst>
           </p:cNvPr>
-          <p:cNvPicPr>
-            <a:picLocks noChangeAspect="1" noChangeArrowheads="1"/>
-          </p:cNvPicPr>
-          <p:nvPr/>
-        </p:nvPicPr>
-        <p:blipFill>
-          <a:blip r:embed="rId4">
-            <a:extLst>
-              <a:ext uri="{28A0092B-C50C-407E-A947-70E740481C1C}">
-                <a14:useLocalDpi xmlns:a14="http://schemas.microsoft.com/office/drawing/2010/main" val="0"/>
-              </a:ext>
-            </a:extLst>
-          </a:blip>
-          <a:stretch>
-            <a:fillRect/>
-          </a:stretch>
-        </p:blipFill>
-        <p:spPr bwMode="auto">
+          <p:cNvSpPr>
+            <a:spLocks noGrp="1" noRot="1" noChangeAspect="1" noMove="1" noResize="1" noEditPoints="1" noAdjustHandles="1" noChangeArrowheads="1" noChangeShapeType="1" noTextEdit="1"/>
+          </p:cNvSpPr>
+          <p:nvPr>
+            <p:extLst>
+              <p:ext uri="{386F3935-93C4-4BCD-93E2-E3B085C9AB24}">
+                <p16:designElem xmlns:p16="http://schemas.microsoft.com/office/powerpoint/2015/main" val="1"/>
+              </p:ext>
+            </p:extLst>
+          </p:nvPr>
+        </p:nvSpPr>
+        <p:spPr>
           <a:xfrm>
-            <a:off x="4806175" y="1456660"/>
-            <a:ext cx="7007266" cy="3774558"/>
+            <a:off x="4630994" y="620720"/>
+            <a:ext cx="6929447" cy="5272133"/>
           </a:xfrm>
           <a:prstGeom prst="roundRect">
             <a:avLst>
-              <a:gd name="adj" fmla="val 3517"/>
+              <a:gd name="adj" fmla="val 3812"/>
             </a:avLst>
           </a:prstGeom>
-          <a:noFill/>
+          <a:solidFill>
+            <a:schemeClr val="bg1"/>
+          </a:solidFill>
           <a:ln w="38100">
             <a:gradFill flip="none" rotWithShape="1">
               <a:gsLst>
@@ -9351,15 +9681,64 @@
               </a:srgbClr>
             </a:innerShdw>
           </a:effectLst>
-          <a:extLst>
-            <a:ext uri="{909E8E84-426E-40DD-AFC4-6F175D3DCCD1}">
-              <a14:hiddenFill xmlns:a14="http://schemas.microsoft.com/office/drawing/2010/main">
-                <a:solidFill>
-                  <a:srgbClr val="FFFFFF"/>
-                </a:solidFill>
-              </a14:hiddenFill>
-            </a:ext>
-          </a:extLst>
+        </p:spPr>
+        <p:style>
+          <a:lnRef idx="2">
+            <a:schemeClr val="accent1">
+              <a:shade val="50000"/>
+            </a:schemeClr>
+          </a:lnRef>
+          <a:fillRef idx="1">
+            <a:schemeClr val="accent1"/>
+          </a:fillRef>
+          <a:effectRef idx="0">
+            <a:schemeClr val="accent1"/>
+          </a:effectRef>
+          <a:fontRef idx="minor">
+            <a:schemeClr val="lt1"/>
+          </a:fontRef>
+        </p:style>
+        <p:txBody>
+          <a:bodyPr rtlCol="0" anchor="ctr"/>
+          <a:lstStyle/>
+          <a:p>
+            <a:pPr algn="ctr"/>
+            <a:endParaRPr lang="en-US">
+              <a:solidFill>
+                <a:schemeClr val="tx1"/>
+              </a:solidFill>
+            </a:endParaRPr>
+          </a:p>
+        </p:txBody>
+      </p:sp>
+      <p:pic>
+        <p:nvPicPr>
+          <p:cNvPr id="8" name="Immagine 7">
+            <a:extLst>
+              <a:ext uri="{FF2B5EF4-FFF2-40B4-BE49-F238E27FC236}">
+                <a16:creationId xmlns:a16="http://schemas.microsoft.com/office/drawing/2014/main" id="{E7D46B90-C7C4-4BFC-BB1B-77A9A72586D3}"/>
+              </a:ext>
+            </a:extLst>
+          </p:cNvPr>
+          <p:cNvPicPr>
+            <a:picLocks noChangeAspect="1"/>
+          </p:cNvPicPr>
+          <p:nvPr/>
+        </p:nvPicPr>
+        <p:blipFill>
+          <a:blip r:embed="rId2"/>
+          <a:stretch>
+            <a:fillRect/>
+          </a:stretch>
+        </p:blipFill>
+        <p:spPr>
+          <a:xfrm>
+            <a:off x="5128626" y="1135316"/>
+            <a:ext cx="5934182" cy="4242940"/>
+          </a:xfrm>
+          <a:prstGeom prst="rect">
+            <a:avLst/>
+          </a:prstGeom>
         </p:spPr>
       </p:pic>
     </p:spTree>
@@ -9370,7 +9749,7 @@
     </p:extLst>
   </p:cSld>
   <p:clrMapOvr>
-    <a:masterClrMapping/>
+    <a:overrideClrMapping bg1="lt1" tx1="dk1" bg2="lt2" tx2="dk2" accent1="accent1" accent2="accent2" accent3="accent3" accent4="accent4" accent5="accent5" accent6="accent6" hlink="hlink" folHlink="folHlink"/>
   </p:clrMapOvr>
 </p:sld>
 </file>
@@ -9433,84 +9812,51 @@
         </p:nvSpPr>
         <p:spPr>
           <a:xfrm>
-            <a:off x="2502605" y="166540"/>
-            <a:ext cx="7871543" cy="1905000"/>
+            <a:off x="1751012" y="4363271"/>
+            <a:ext cx="8676222" cy="1066801"/>
           </a:xfrm>
         </p:spPr>
         <p:txBody>
-          <a:bodyPr>
+          <a:bodyPr vert="horz" lIns="91440" tIns="45720" rIns="91440" bIns="45720" rtlCol="0" anchor="b">
             <a:normAutofit/>
           </a:bodyPr>
           <a:lstStyle/>
           <a:p>
-            <a:r>
-              <a:rPr lang="en-US" dirty="0" err="1">
+            <a:pPr algn="ctr">
+              <a:lnSpc>
+                <a:spcPct val="90000"/>
+              </a:lnSpc>
+            </a:pPr>
+            <a:r>
+              <a:rPr lang="en-US" sz="3400">
                 <a:effectLst>
                   <a:glow rad="38100">
-                    <a:prstClr val="black">
+                    <a:schemeClr val="bg1">
                       <a:lumMod val="65000"/>
                       <a:lumOff val="35000"/>
-                      <a:alpha val="40000"/>
-                    </a:prstClr>
+                      <a:alpha val="50000"/>
+                    </a:schemeClr>
                   </a:glow>
-                  <a:outerShdw blurRad="28575" dist="38100" dir="14040000" algn="tl" rotWithShape="0">
+                  <a:outerShdw blurRad="28575" dist="31750" dir="13200000" algn="tl" rotWithShape="0">
                     <a:srgbClr val="000000">
                       <a:alpha val="25000"/>
                     </a:srgbClr>
                   </a:outerShdw>
                 </a:effectLst>
               </a:rPr>
-              <a:t>Proposta</a:t>
-            </a:r>
-            <a:r>
-              <a:rPr lang="en-US" dirty="0">
+              <a:t>Proposta implementativa</a:t>
+            </a:r>
+            <a:br>
+              <a:rPr lang="en-US" sz="3400">
                 <a:effectLst>
                   <a:glow rad="38100">
-                    <a:prstClr val="black">
+                    <a:schemeClr val="bg1">
                       <a:lumMod val="65000"/>
                       <a:lumOff val="35000"/>
-                      <a:alpha val="40000"/>
-                    </a:prstClr>
+                      <a:alpha val="50000"/>
+                    </a:schemeClr>
                   </a:glow>
-                  <a:outerShdw blurRad="28575" dist="38100" dir="14040000" algn="tl" rotWithShape="0">
-                    <a:srgbClr val="000000">
-                      <a:alpha val="25000"/>
-                    </a:srgbClr>
-                  </a:outerShdw>
-                </a:effectLst>
-              </a:rPr>
-              <a:t> </a:t>
-            </a:r>
-            <a:r>
-              <a:rPr lang="en-US" dirty="0" err="1">
-                <a:effectLst>
-                  <a:glow rad="38100">
-                    <a:prstClr val="black">
-                      <a:lumMod val="65000"/>
-                      <a:lumOff val="35000"/>
-                      <a:alpha val="40000"/>
-                    </a:prstClr>
-                  </a:glow>
-                  <a:outerShdw blurRad="28575" dist="38100" dir="14040000" algn="tl" rotWithShape="0">
-                    <a:srgbClr val="000000">
-                      <a:alpha val="25000"/>
-                    </a:srgbClr>
-                  </a:outerShdw>
-                </a:effectLst>
-              </a:rPr>
-              <a:t>implementativa</a:t>
-            </a:r>
-            <a:br>
-              <a:rPr lang="en-US" dirty="0">
-                <a:effectLst>
-                  <a:glow rad="38100">
-                    <a:prstClr val="black">
-                      <a:lumMod val="65000"/>
-                      <a:lumOff val="35000"/>
-                      <a:alpha val="40000"/>
-                    </a:prstClr>
-                  </a:glow>
-                  <a:outerShdw blurRad="28575" dist="38100" dir="14040000" algn="tl" rotWithShape="0">
+                  <a:outerShdw blurRad="28575" dist="31750" dir="13200000" algn="tl" rotWithShape="0">
                     <a:srgbClr val="000000">
                       <a:alpha val="25000"/>
                     </a:srgbClr>
@@ -9518,7 +9864,22 @@
                 </a:effectLst>
               </a:rPr>
             </a:br>
-            <a:endParaRPr lang="en-US" dirty="0"/>
+            <a:endParaRPr lang="en-US" sz="3400">
+              <a:effectLst>
+                <a:glow rad="38100">
+                  <a:schemeClr val="bg1">
+                    <a:lumMod val="65000"/>
+                    <a:lumOff val="35000"/>
+                    <a:alpha val="50000"/>
+                  </a:schemeClr>
+                </a:glow>
+                <a:outerShdw blurRad="28575" dist="31750" dir="13200000" algn="tl" rotWithShape="0">
+                  <a:srgbClr val="000000">
+                    <a:alpha val="25000"/>
+                  </a:srgbClr>
+                </a:outerShdw>
+              </a:effectLst>
+            </a:endParaRPr>
           </a:p>
         </p:txBody>
       </p:sp>
@@ -9540,122 +9901,95 @@
         </p:nvSpPr>
         <p:spPr>
           <a:xfrm>
-            <a:off x="1546806" y="5598735"/>
-            <a:ext cx="8068533" cy="943467"/>
+            <a:off x="1751012" y="5516211"/>
+            <a:ext cx="8676222" cy="722243"/>
           </a:xfrm>
         </p:spPr>
         <p:txBody>
-          <a:bodyPr anchor="t">
+          <a:bodyPr vert="horz" lIns="91440" tIns="45720" rIns="91440" bIns="45720" rtlCol="0" anchor="t">
             <a:normAutofit/>
           </a:bodyPr>
           <a:lstStyle/>
           <a:p>
-            <a:pPr>
+            <a:pPr marL="0" indent="0" algn="ctr">
               <a:lnSpc>
                 <a:spcPct val="90000"/>
               </a:lnSpc>
-              <a:buClr>
-                <a:srgbClr val="FFFFFF"/>
-              </a:buClr>
+              <a:buNone/>
             </a:pPr>
             <a:br>
-              <a:rPr lang="en-US" sz="1600" dirty="0">
-                <a:effectLst>
-                  <a:glow rad="38100">
-                    <a:prstClr val="black">
-                      <a:lumMod val="50000"/>
-                      <a:lumOff val="50000"/>
-                      <a:alpha val="20000"/>
-                    </a:prstClr>
-                  </a:glow>
-                  <a:outerShdw blurRad="44450" dist="12700" dir="13860000" algn="tl" rotWithShape="0">
-                    <a:srgbClr val="000000">
-                      <a:alpha val="20000"/>
-                    </a:srgbClr>
-                  </a:outerShdw>
-                </a:effectLst>
+              <a:rPr lang="en-US" sz="2100">
+                <a:gradFill flip="none" rotWithShape="1">
+                  <a:gsLst>
+                    <a:gs pos="0">
+                      <a:schemeClr val="tx1"/>
+                    </a:gs>
+                    <a:gs pos="100000">
+                      <a:schemeClr val="tx1">
+                        <a:lumMod val="75000"/>
+                      </a:schemeClr>
+                    </a:gs>
+                  </a:gsLst>
+                  <a:lin ang="5400000" scaled="0"/>
+                  <a:tileRect/>
+                </a:gradFill>
               </a:rPr>
             </a:br>
             <a:r>
-              <a:rPr lang="en-US" sz="1600" dirty="0">
-                <a:effectLst>
-                  <a:glow rad="38100">
-                    <a:prstClr val="black">
-                      <a:lumMod val="50000"/>
-                      <a:lumOff val="50000"/>
-                      <a:alpha val="20000"/>
-                    </a:prstClr>
-                  </a:glow>
-                  <a:outerShdw blurRad="44450" dist="12700" dir="13860000" algn="tl" rotWithShape="0">
-                    <a:srgbClr val="000000">
-                      <a:alpha val="20000"/>
-                    </a:srgbClr>
-                  </a:outerShdw>
-                </a:effectLst>
+              <a:rPr lang="en-US" sz="2100">
+                <a:gradFill flip="none" rotWithShape="1">
+                  <a:gsLst>
+                    <a:gs pos="0">
+                      <a:schemeClr val="tx1"/>
+                    </a:gs>
+                    <a:gs pos="100000">
+                      <a:schemeClr val="tx1">
+                        <a:lumMod val="75000"/>
+                      </a:schemeClr>
+                    </a:gs>
+                  </a:gsLst>
+                  <a:lin ang="5400000" scaled="0"/>
+                  <a:tileRect/>
+                </a:gradFill>
               </a:rPr>
-              <a:t>(</a:t>
-            </a:r>
-            <a:r>
-              <a:rPr lang="en-US" sz="1600" dirty="0">
-                <a:effectLst>
-                  <a:glow rad="38100">
-                    <a:prstClr val="black">
-                      <a:lumMod val="50000"/>
-                      <a:lumOff val="50000"/>
-                      <a:alpha val="20000"/>
-                    </a:prstClr>
-                  </a:glow>
-                  <a:outerShdw blurRad="44450" dist="12700" dir="13860000" algn="tl" rotWithShape="0">
-                    <a:srgbClr val="000000">
-                      <a:alpha val="20000"/>
-                    </a:srgbClr>
-                  </a:outerShdw>
-                </a:effectLst>
-                <a:ea typeface="+mn-lt"/>
-                <a:cs typeface="+mn-lt"/>
-              </a:rPr>
-              <a:t> </a:t>
-            </a:r>
-            <a:r>
-              <a:rPr lang="en-US" sz="1600" dirty="0">
-                <a:effectLst>
-                  <a:glow rad="38100">
-                    <a:prstClr val="black">
-                      <a:lumMod val="50000"/>
-                      <a:lumOff val="50000"/>
-                      <a:alpha val="20000"/>
-                    </a:prstClr>
-                  </a:glow>
-                  <a:outerShdw blurRad="44450" dist="12700" dir="13860000" algn="tl" rotWithShape="0">
-                    <a:srgbClr val="000000">
-                      <a:alpha val="20000"/>
-                    </a:srgbClr>
-                  </a:outerShdw>
-                </a:effectLst>
-                <a:ea typeface="+mn-lt"/>
-                <a:cs typeface="+mn-lt"/>
+              <a:t>( </a:t>
+            </a:r>
+            <a:r>
+              <a:rPr lang="en-US" sz="2100">
+                <a:gradFill flip="none" rotWithShape="1">
+                  <a:gsLst>
+                    <a:gs pos="0">
+                      <a:schemeClr val="tx1"/>
+                    </a:gs>
+                    <a:gs pos="100000">
+                      <a:schemeClr val="tx1">
+                        <a:lumMod val="75000"/>
+                      </a:schemeClr>
+                    </a:gs>
+                  </a:gsLst>
+                  <a:lin ang="5400000" scaled="0"/>
+                  <a:tileRect/>
+                </a:gradFill>
                 <a:hlinkClick r:id="rId3"/>
               </a:rPr>
               <a:t>https://github.com/Fillayth/multimodello_speaker_recognition</a:t>
             </a:r>
             <a:r>
-              <a:rPr lang="en-US" sz="1600" dirty="0">
-                <a:effectLst>
-                  <a:glow rad="38100">
-                    <a:prstClr val="black">
-                      <a:lumMod val="50000"/>
-                      <a:lumOff val="50000"/>
-                      <a:alpha val="20000"/>
-                    </a:prstClr>
-                  </a:glow>
-                  <a:outerShdw blurRad="44450" dist="12700" dir="13860000" algn="tl" rotWithShape="0">
-                    <a:srgbClr val="000000">
-                      <a:alpha val="20000"/>
-                    </a:srgbClr>
-                  </a:outerShdw>
-                </a:effectLst>
-                <a:ea typeface="+mn-lt"/>
-                <a:cs typeface="+mn-lt"/>
+              <a:rPr lang="en-US" sz="2100">
+                <a:gradFill flip="none" rotWithShape="1">
+                  <a:gsLst>
+                    <a:gs pos="0">
+                      <a:schemeClr val="tx1"/>
+                    </a:gs>
+                    <a:gs pos="100000">
+                      <a:schemeClr val="tx1">
+                        <a:lumMod val="75000"/>
+                      </a:schemeClr>
+                    </a:gs>
+                  </a:gsLst>
+                  <a:lin ang="5400000" scaled="0"/>
+                  <a:tileRect/>
+                </a:gradFill>
               </a:rPr>
               <a:t> )</a:t>
             </a:r>
@@ -9684,8 +10018,8 @@
         </p:blipFill>
         <p:spPr>
           <a:xfrm>
-            <a:off x="1642433" y="1375331"/>
-            <a:ext cx="7871543" cy="4408064"/>
+            <a:off x="2876960" y="640080"/>
+            <a:ext cx="6433456" cy="3602736"/>
           </a:xfrm>
           <a:prstGeom prst="roundRect">
             <a:avLst>
@@ -9788,57 +10122,571 @@
         </p:nvSpPr>
         <p:spPr>
           <a:xfrm>
-            <a:off x="486887" y="0"/>
-            <a:ext cx="6573685" cy="1905000"/>
+            <a:off x="643192" y="609600"/>
+            <a:ext cx="3643674" cy="1905000"/>
           </a:xfrm>
         </p:spPr>
         <p:txBody>
-          <a:bodyPr>
+          <a:bodyPr vert="horz" lIns="91440" tIns="45720" rIns="91440" bIns="45720" rtlCol="0" anchor="ctr">
             <a:normAutofit/>
           </a:bodyPr>
           <a:lstStyle/>
           <a:p>
             <a:r>
-              <a:rPr lang="en-US" dirty="0">
+              <a:rPr lang="en-US" sz="2800">
+                <a:hlinkClick r:id="rId4"/>
+              </a:rPr>
+              <a:t>Repository di partenza</a:t>
+            </a:r>
+            <a:endParaRPr lang="en-US" sz="2800"/>
+          </a:p>
+        </p:txBody>
+      </p:sp>
+      <p:sp>
+        <p:nvSpPr>
+          <p:cNvPr id="7" name="CasellaDiTesto 6">
+            <a:extLst>
+              <a:ext uri="{FF2B5EF4-FFF2-40B4-BE49-F238E27FC236}">
+                <a16:creationId xmlns:a16="http://schemas.microsoft.com/office/drawing/2014/main" id="{5A88EDC4-94F1-441A-B532-5C0920ECFB30}"/>
+              </a:ext>
+            </a:extLst>
+          </p:cNvPr>
+          <p:cNvSpPr txBox="1"/>
+          <p:nvPr/>
+        </p:nvSpPr>
+        <p:spPr>
+          <a:xfrm>
+            <a:off x="643192" y="2666999"/>
+            <a:ext cx="3643674" cy="3216276"/>
+          </a:xfrm>
+          <a:prstGeom prst="rect">
+            <a:avLst/>
+          </a:prstGeom>
+        </p:spPr>
+        <p:txBody>
+          <a:bodyPr vert="horz" lIns="91440" tIns="45720" rIns="91440" bIns="45720" rtlCol="0" anchor="t">
+            <a:normAutofit/>
+          </a:bodyPr>
+          <a:lstStyle/>
+          <a:p>
+            <a:pPr marL="285750" indent="-285750">
+              <a:spcBef>
+                <a:spcPct val="20000"/>
+              </a:spcBef>
+              <a:spcAft>
+                <a:spcPts val="600"/>
+              </a:spcAft>
+              <a:buClr>
+                <a:schemeClr val="tx1"/>
+              </a:buClr>
+              <a:buSzPct val="100000"/>
+              <a:buFont typeface="Arial"/>
+              <a:buChar char="•"/>
+            </a:pPr>
+            <a:r>
+              <a:rPr lang="en-US" cap="small">
+                <a:gradFill flip="none" rotWithShape="1">
+                  <a:gsLst>
+                    <a:gs pos="0">
+                      <a:schemeClr val="tx1"/>
+                    </a:gs>
+                    <a:gs pos="100000">
+                      <a:schemeClr val="tx1">
+                        <a:lumMod val="75000"/>
+                      </a:schemeClr>
+                    </a:gs>
+                  </a:gsLst>
+                  <a:lin ang="5580000" scaled="0"/>
+                  <a:tileRect/>
+                </a:gradFill>
                 <a:effectLst>
                   <a:glow rad="38100">
-                    <a:prstClr val="black">
-                      <a:lumMod val="65000"/>
-                      <a:lumOff val="35000"/>
-                      <a:alpha val="40000"/>
-                    </a:prstClr>
+                    <a:schemeClr val="bg1">
+                      <a:lumMod val="50000"/>
+                      <a:lumOff val="50000"/>
+                      <a:alpha val="20000"/>
+                    </a:schemeClr>
                   </a:glow>
-                  <a:outerShdw blurRad="28575" dist="38100" dir="14040000" algn="tl" rotWithShape="0">
+                  <a:outerShdw blurRad="44450" dist="12700" dir="13860000" algn="tl" rotWithShape="0">
                     <a:srgbClr val="000000">
-                      <a:alpha val="25000"/>
+                      <a:alpha val="20000"/>
                     </a:srgbClr>
                   </a:outerShdw>
                 </a:effectLst>
-                <a:hlinkClick r:id="rId4"/>
               </a:rPr>
-              <a:t>Repository di </a:t>
-            </a:r>
-            <a:r>
-              <a:rPr lang="it-IT" dirty="0">
+              <a:t>Identificazione ottenuta solo tramite GMM</a:t>
+            </a:r>
+            <a:br>
+              <a:rPr lang="en-US" cap="small">
+                <a:gradFill flip="none" rotWithShape="1">
+                  <a:gsLst>
+                    <a:gs pos="0">
+                      <a:schemeClr val="tx1"/>
+                    </a:gs>
+                    <a:gs pos="100000">
+                      <a:schemeClr val="tx1">
+                        <a:lumMod val="75000"/>
+                      </a:schemeClr>
+                    </a:gs>
+                  </a:gsLst>
+                  <a:lin ang="5580000" scaled="0"/>
+                  <a:tileRect/>
+                </a:gradFill>
                 <a:effectLst>
                   <a:glow rad="38100">
-                    <a:prstClr val="black">
-                      <a:lumMod val="65000"/>
-                      <a:lumOff val="35000"/>
-                      <a:alpha val="40000"/>
-                    </a:prstClr>
+                    <a:schemeClr val="bg1">
+                      <a:lumMod val="50000"/>
+                      <a:lumOff val="50000"/>
+                      <a:alpha val="20000"/>
+                    </a:schemeClr>
                   </a:glow>
-                  <a:outerShdw blurRad="28575" dist="38100" dir="14040000" algn="tl" rotWithShape="0">
+                  <a:outerShdw blurRad="44450" dist="12700" dir="13860000" algn="tl" rotWithShape="0">
                     <a:srgbClr val="000000">
-                      <a:alpha val="25000"/>
+                      <a:alpha val="20000"/>
                     </a:srgbClr>
                   </a:outerShdw>
                 </a:effectLst>
-                <a:hlinkClick r:id="rId4"/>
               </a:rPr>
-              <a:t>partenza</a:t>
-            </a:r>
-            <a:endParaRPr lang="it-IT" dirty="0"/>
+            </a:br>
+            <a:endParaRPr lang="en-US" cap="small">
+              <a:gradFill flip="none" rotWithShape="1">
+                <a:gsLst>
+                  <a:gs pos="0">
+                    <a:schemeClr val="tx1"/>
+                  </a:gs>
+                  <a:gs pos="100000">
+                    <a:schemeClr val="tx1">
+                      <a:lumMod val="75000"/>
+                    </a:schemeClr>
+                  </a:gs>
+                </a:gsLst>
+                <a:lin ang="5580000" scaled="0"/>
+                <a:tileRect/>
+              </a:gradFill>
+              <a:effectLst>
+                <a:glow rad="38100">
+                  <a:schemeClr val="bg1">
+                    <a:lumMod val="50000"/>
+                    <a:lumOff val="50000"/>
+                    <a:alpha val="20000"/>
+                  </a:schemeClr>
+                </a:glow>
+                <a:outerShdw blurRad="44450" dist="12700" dir="13860000" algn="tl" rotWithShape="0">
+                  <a:srgbClr val="000000">
+                    <a:alpha val="20000"/>
+                  </a:srgbClr>
+                </a:outerShdw>
+              </a:effectLst>
+            </a:endParaRPr>
+          </a:p>
+          <a:p>
+            <a:pPr marL="285750" indent="-285750">
+              <a:spcBef>
+                <a:spcPct val="20000"/>
+              </a:spcBef>
+              <a:spcAft>
+                <a:spcPts val="600"/>
+              </a:spcAft>
+              <a:buClr>
+                <a:schemeClr val="tx1"/>
+              </a:buClr>
+              <a:buSzPct val="100000"/>
+              <a:buFont typeface="Arial"/>
+              <a:buChar char="•"/>
+            </a:pPr>
+            <a:r>
+              <a:rPr lang="en-US" cap="small">
+                <a:gradFill flip="none" rotWithShape="1">
+                  <a:gsLst>
+                    <a:gs pos="0">
+                      <a:schemeClr val="tx1"/>
+                    </a:gs>
+                    <a:gs pos="100000">
+                      <a:schemeClr val="tx1">
+                        <a:lumMod val="75000"/>
+                      </a:schemeClr>
+                    </a:gs>
+                  </a:gsLst>
+                  <a:lin ang="5580000" scaled="0"/>
+                  <a:tileRect/>
+                </a:gradFill>
+                <a:effectLst>
+                  <a:glow rad="38100">
+                    <a:schemeClr val="bg1">
+                      <a:lumMod val="50000"/>
+                      <a:lumOff val="50000"/>
+                      <a:alpha val="20000"/>
+                    </a:schemeClr>
+                  </a:glow>
+                  <a:outerShdw blurRad="44450" dist="12700" dir="13860000" algn="tl" rotWithShape="0">
+                    <a:srgbClr val="000000">
+                      <a:alpha val="20000"/>
+                    </a:srgbClr>
+                  </a:outerShdw>
+                </a:effectLst>
+              </a:rPr>
+              <a:t>Librerie:</a:t>
+            </a:r>
+            <a:br>
+              <a:rPr lang="en-US" cap="small">
+                <a:gradFill flip="none" rotWithShape="1">
+                  <a:gsLst>
+                    <a:gs pos="0">
+                      <a:schemeClr val="tx1"/>
+                    </a:gs>
+                    <a:gs pos="100000">
+                      <a:schemeClr val="tx1">
+                        <a:lumMod val="75000"/>
+                      </a:schemeClr>
+                    </a:gs>
+                  </a:gsLst>
+                  <a:lin ang="5580000" scaled="0"/>
+                  <a:tileRect/>
+                </a:gradFill>
+                <a:effectLst>
+                  <a:glow rad="38100">
+                    <a:schemeClr val="bg1">
+                      <a:lumMod val="50000"/>
+                      <a:lumOff val="50000"/>
+                      <a:alpha val="20000"/>
+                    </a:schemeClr>
+                  </a:glow>
+                  <a:outerShdw blurRad="44450" dist="12700" dir="13860000" algn="tl" rotWithShape="0">
+                    <a:srgbClr val="000000">
+                      <a:alpha val="20000"/>
+                    </a:srgbClr>
+                  </a:outerShdw>
+                </a:effectLst>
+              </a:rPr>
+            </a:br>
+            <a:r>
+              <a:rPr lang="en-US" cap="small">
+                <a:gradFill flip="none" rotWithShape="1">
+                  <a:gsLst>
+                    <a:gs pos="0">
+                      <a:schemeClr val="tx1"/>
+                    </a:gs>
+                    <a:gs pos="100000">
+                      <a:schemeClr val="tx1">
+                        <a:lumMod val="75000"/>
+                      </a:schemeClr>
+                    </a:gs>
+                  </a:gsLst>
+                  <a:lin ang="5580000" scaled="0"/>
+                  <a:tileRect/>
+                </a:gradFill>
+                <a:effectLst>
+                  <a:glow rad="38100">
+                    <a:schemeClr val="bg1">
+                      <a:lumMod val="50000"/>
+                      <a:lumOff val="50000"/>
+                      <a:alpha val="20000"/>
+                    </a:schemeClr>
+                  </a:glow>
+                  <a:outerShdw blurRad="44450" dist="12700" dir="13860000" algn="tl" rotWithShape="0">
+                    <a:srgbClr val="000000">
+                      <a:alpha val="20000"/>
+                    </a:srgbClr>
+                  </a:outerShdw>
+                </a:effectLst>
+              </a:rPr>
+              <a:t>- </a:t>
+            </a:r>
+            <a:r>
+              <a:rPr lang="en-US" cap="small">
+                <a:gradFill flip="none" rotWithShape="1">
+                  <a:gsLst>
+                    <a:gs pos="0">
+                      <a:schemeClr val="tx1"/>
+                    </a:gs>
+                    <a:gs pos="100000">
+                      <a:schemeClr val="tx1">
+                        <a:lumMod val="75000"/>
+                      </a:schemeClr>
+                    </a:gs>
+                  </a:gsLst>
+                  <a:lin ang="5580000" scaled="0"/>
+                  <a:tileRect/>
+                </a:gradFill>
+                <a:effectLst>
+                  <a:glow rad="38100">
+                    <a:schemeClr val="bg1">
+                      <a:lumMod val="50000"/>
+                      <a:lumOff val="50000"/>
+                      <a:alpha val="20000"/>
+                    </a:schemeClr>
+                  </a:glow>
+                  <a:outerShdw blurRad="44450" dist="12700" dir="13860000" algn="tl" rotWithShape="0">
+                    <a:srgbClr val="000000">
+                      <a:alpha val="20000"/>
+                    </a:srgbClr>
+                  </a:outerShdw>
+                </a:effectLst>
+                <a:hlinkClick r:id="rId5"/>
+              </a:rPr>
+              <a:t>numpy</a:t>
+            </a:r>
+            <a:r>
+              <a:rPr lang="en-US" cap="small">
+                <a:gradFill flip="none" rotWithShape="1">
+                  <a:gsLst>
+                    <a:gs pos="0">
+                      <a:schemeClr val="tx1"/>
+                    </a:gs>
+                    <a:gs pos="100000">
+                      <a:schemeClr val="tx1">
+                        <a:lumMod val="75000"/>
+                      </a:schemeClr>
+                    </a:gs>
+                  </a:gsLst>
+                  <a:lin ang="5580000" scaled="0"/>
+                  <a:tileRect/>
+                </a:gradFill>
+                <a:effectLst>
+                  <a:glow rad="38100">
+                    <a:schemeClr val="bg1">
+                      <a:lumMod val="50000"/>
+                      <a:lumOff val="50000"/>
+                      <a:alpha val="20000"/>
+                    </a:schemeClr>
+                  </a:glow>
+                  <a:outerShdw blurRad="44450" dist="12700" dir="13860000" algn="tl" rotWithShape="0">
+                    <a:srgbClr val="000000">
+                      <a:alpha val="20000"/>
+                    </a:srgbClr>
+                  </a:outerShdw>
+                </a:effectLst>
+              </a:rPr>
+              <a:t> </a:t>
+            </a:r>
+            <a:br>
+              <a:rPr lang="en-US" cap="small">
+                <a:gradFill flip="none" rotWithShape="1">
+                  <a:gsLst>
+                    <a:gs pos="0">
+                      <a:schemeClr val="tx1"/>
+                    </a:gs>
+                    <a:gs pos="100000">
+                      <a:schemeClr val="tx1">
+                        <a:lumMod val="75000"/>
+                      </a:schemeClr>
+                    </a:gs>
+                  </a:gsLst>
+                  <a:lin ang="5580000" scaled="0"/>
+                  <a:tileRect/>
+                </a:gradFill>
+                <a:effectLst>
+                  <a:glow rad="38100">
+                    <a:schemeClr val="bg1">
+                      <a:lumMod val="50000"/>
+                      <a:lumOff val="50000"/>
+                      <a:alpha val="20000"/>
+                    </a:schemeClr>
+                  </a:glow>
+                  <a:outerShdw blurRad="44450" dist="12700" dir="13860000" algn="tl" rotWithShape="0">
+                    <a:srgbClr val="000000">
+                      <a:alpha val="20000"/>
+                    </a:srgbClr>
+                  </a:outerShdw>
+                </a:effectLst>
+              </a:rPr>
+            </a:br>
+            <a:r>
+              <a:rPr lang="en-US" cap="small">
+                <a:gradFill flip="none" rotWithShape="1">
+                  <a:gsLst>
+                    <a:gs pos="0">
+                      <a:schemeClr val="tx1"/>
+                    </a:gs>
+                    <a:gs pos="100000">
+                      <a:schemeClr val="tx1">
+                        <a:lumMod val="75000"/>
+                      </a:schemeClr>
+                    </a:gs>
+                  </a:gsLst>
+                  <a:lin ang="5580000" scaled="0"/>
+                  <a:tileRect/>
+                </a:gradFill>
+                <a:effectLst>
+                  <a:glow rad="38100">
+                    <a:schemeClr val="bg1">
+                      <a:lumMod val="50000"/>
+                      <a:lumOff val="50000"/>
+                      <a:alpha val="20000"/>
+                    </a:schemeClr>
+                  </a:glow>
+                  <a:outerShdw blurRad="44450" dist="12700" dir="13860000" algn="tl" rotWithShape="0">
+                    <a:srgbClr val="000000">
+                      <a:alpha val="20000"/>
+                    </a:srgbClr>
+                  </a:outerShdw>
+                </a:effectLst>
+              </a:rPr>
+              <a:t>- </a:t>
+            </a:r>
+            <a:r>
+              <a:rPr lang="en-US" cap="small">
+                <a:gradFill flip="none" rotWithShape="1">
+                  <a:gsLst>
+                    <a:gs pos="0">
+                      <a:schemeClr val="tx1"/>
+                    </a:gs>
+                    <a:gs pos="100000">
+                      <a:schemeClr val="tx1">
+                        <a:lumMod val="75000"/>
+                      </a:schemeClr>
+                    </a:gs>
+                  </a:gsLst>
+                  <a:lin ang="5580000" scaled="0"/>
+                  <a:tileRect/>
+                </a:gradFill>
+                <a:effectLst>
+                  <a:glow rad="38100">
+                    <a:schemeClr val="bg1">
+                      <a:lumMod val="50000"/>
+                      <a:lumOff val="50000"/>
+                      <a:alpha val="20000"/>
+                    </a:schemeClr>
+                  </a:glow>
+                  <a:outerShdw blurRad="44450" dist="12700" dir="13860000" algn="tl" rotWithShape="0">
+                    <a:srgbClr val="000000">
+                      <a:alpha val="20000"/>
+                    </a:srgbClr>
+                  </a:outerShdw>
+                </a:effectLst>
+                <a:hlinkClick r:id="rId6"/>
+              </a:rPr>
+              <a:t>scikit-learn</a:t>
+            </a:r>
+            <a:br>
+              <a:rPr lang="en-US" cap="small">
+                <a:gradFill flip="none" rotWithShape="1">
+                  <a:gsLst>
+                    <a:gs pos="0">
+                      <a:schemeClr val="tx1"/>
+                    </a:gs>
+                    <a:gs pos="100000">
+                      <a:schemeClr val="tx1">
+                        <a:lumMod val="75000"/>
+                      </a:schemeClr>
+                    </a:gs>
+                  </a:gsLst>
+                  <a:lin ang="5580000" scaled="0"/>
+                  <a:tileRect/>
+                </a:gradFill>
+                <a:effectLst>
+                  <a:glow rad="38100">
+                    <a:schemeClr val="bg1">
+                      <a:lumMod val="50000"/>
+                      <a:lumOff val="50000"/>
+                      <a:alpha val="20000"/>
+                    </a:schemeClr>
+                  </a:glow>
+                  <a:outerShdw blurRad="44450" dist="12700" dir="13860000" algn="tl" rotWithShape="0">
+                    <a:srgbClr val="000000">
+                      <a:alpha val="20000"/>
+                    </a:srgbClr>
+                  </a:outerShdw>
+                </a:effectLst>
+              </a:rPr>
+            </a:br>
+            <a:r>
+              <a:rPr lang="en-US" cap="small">
+                <a:gradFill flip="none" rotWithShape="1">
+                  <a:gsLst>
+                    <a:gs pos="0">
+                      <a:schemeClr val="tx1"/>
+                    </a:gs>
+                    <a:gs pos="100000">
+                      <a:schemeClr val="tx1">
+                        <a:lumMod val="75000"/>
+                      </a:schemeClr>
+                    </a:gs>
+                  </a:gsLst>
+                  <a:lin ang="5580000" scaled="0"/>
+                  <a:tileRect/>
+                </a:gradFill>
+                <a:effectLst>
+                  <a:glow rad="38100">
+                    <a:schemeClr val="bg1">
+                      <a:lumMod val="50000"/>
+                      <a:lumOff val="50000"/>
+                      <a:alpha val="20000"/>
+                    </a:schemeClr>
+                  </a:glow>
+                  <a:outerShdw blurRad="44450" dist="12700" dir="13860000" algn="tl" rotWithShape="0">
+                    <a:srgbClr val="000000">
+                      <a:alpha val="20000"/>
+                    </a:srgbClr>
+                  </a:outerShdw>
+                </a:effectLst>
+              </a:rPr>
+              <a:t>- </a:t>
+            </a:r>
+            <a:r>
+              <a:rPr lang="en-US" cap="small">
+                <a:gradFill flip="none" rotWithShape="1">
+                  <a:gsLst>
+                    <a:gs pos="0">
+                      <a:schemeClr val="tx1"/>
+                    </a:gs>
+                    <a:gs pos="100000">
+                      <a:schemeClr val="tx1">
+                        <a:lumMod val="75000"/>
+                      </a:schemeClr>
+                    </a:gs>
+                  </a:gsLst>
+                  <a:lin ang="5580000" scaled="0"/>
+                  <a:tileRect/>
+                </a:gradFill>
+                <a:effectLst>
+                  <a:glow rad="38100">
+                    <a:schemeClr val="bg1">
+                      <a:lumMod val="50000"/>
+                      <a:lumOff val="50000"/>
+                      <a:alpha val="20000"/>
+                    </a:schemeClr>
+                  </a:glow>
+                  <a:outerShdw blurRad="44450" dist="12700" dir="13860000" algn="tl" rotWithShape="0">
+                    <a:srgbClr val="000000">
+                      <a:alpha val="20000"/>
+                    </a:srgbClr>
+                  </a:outerShdw>
+                </a:effectLst>
+                <a:hlinkClick r:id="rId7"/>
+              </a:rPr>
+              <a:t>python_speech_features</a:t>
+            </a:r>
+            <a:endParaRPr lang="en-US" cap="small">
+              <a:gradFill flip="none" rotWithShape="1">
+                <a:gsLst>
+                  <a:gs pos="0">
+                    <a:schemeClr val="tx1"/>
+                  </a:gs>
+                  <a:gs pos="100000">
+                    <a:schemeClr val="tx1">
+                      <a:lumMod val="75000"/>
+                    </a:schemeClr>
+                  </a:gs>
+                </a:gsLst>
+                <a:lin ang="5580000" scaled="0"/>
+                <a:tileRect/>
+              </a:gradFill>
+              <a:effectLst>
+                <a:glow rad="38100">
+                  <a:schemeClr val="bg1">
+                    <a:lumMod val="50000"/>
+                    <a:lumOff val="50000"/>
+                    <a:alpha val="20000"/>
+                  </a:schemeClr>
+                </a:glow>
+                <a:outerShdw blurRad="44450" dist="12700" dir="13860000" algn="tl" rotWithShape="0">
+                  <a:srgbClr val="000000">
+                    <a:alpha val="20000"/>
+                  </a:srgbClr>
+                </a:outerShdw>
+              </a:effectLst>
+            </a:endParaRPr>
           </a:p>
         </p:txBody>
       </p:sp>
@@ -9857,19 +10705,19 @@
           <p:nvPr/>
         </p:nvPicPr>
         <p:blipFill>
-          <a:blip r:embed="rId5"/>
+          <a:blip r:embed="rId8"/>
           <a:stretch>
             <a:fillRect/>
           </a:stretch>
         </p:blipFill>
         <p:spPr>
           <a:xfrm>
-            <a:off x="4628561" y="1687956"/>
-            <a:ext cx="6920246" cy="4354625"/>
+            <a:off x="4630994" y="1323677"/>
+            <a:ext cx="6916633" cy="3890605"/>
           </a:xfrm>
           <a:prstGeom prst="roundRect">
             <a:avLst>
-              <a:gd name="adj" fmla="val 2214"/>
+              <a:gd name="adj" fmla="val 3517"/>
             </a:avLst>
           </a:prstGeom>
           <a:ln w="38100">
@@ -9897,103 +10745,6 @@
           </a:effectLst>
         </p:spPr>
       </p:pic>
-      <p:sp>
-        <p:nvSpPr>
-          <p:cNvPr id="7" name="CasellaDiTesto 6">
-            <a:extLst>
-              <a:ext uri="{FF2B5EF4-FFF2-40B4-BE49-F238E27FC236}">
-                <a16:creationId xmlns:a16="http://schemas.microsoft.com/office/drawing/2014/main" id="{5A88EDC4-94F1-441A-B532-5C0920ECFB30}"/>
-              </a:ext>
-            </a:extLst>
-          </p:cNvPr>
-          <p:cNvSpPr txBox="1"/>
-          <p:nvPr/>
-        </p:nvSpPr>
-        <p:spPr>
-          <a:xfrm>
-            <a:off x="196886" y="1905000"/>
-            <a:ext cx="4044099" cy="2031325"/>
-          </a:xfrm>
-          <a:prstGeom prst="rect">
-            <a:avLst/>
-          </a:prstGeom>
-          <a:noFill/>
-        </p:spPr>
-        <p:txBody>
-          <a:bodyPr wrap="square" rtlCol="0">
-            <a:spAutoFit/>
-          </a:bodyPr>
-          <a:lstStyle/>
-          <a:p>
-            <a:pPr marL="285750" indent="-285750">
-              <a:buFont typeface="Arial" panose="020B0604020202020204" pitchFamily="34" charset="0"/>
-              <a:buChar char="•"/>
-            </a:pPr>
-            <a:r>
-              <a:rPr lang="it-IT" dirty="0"/>
-              <a:t>Identificazione ottenuta solo tramite GMM</a:t>
-            </a:r>
-            <a:br>
-              <a:rPr lang="it-IT" dirty="0"/>
-            </a:br>
-            <a:endParaRPr lang="it-IT" dirty="0"/>
-          </a:p>
-          <a:p>
-            <a:pPr marL="285750" indent="-285750">
-              <a:buFont typeface="Arial" panose="020B0604020202020204" pitchFamily="34" charset="0"/>
-              <a:buChar char="•"/>
-            </a:pPr>
-            <a:r>
-              <a:rPr lang="it-IT" dirty="0"/>
-              <a:t>Librerie:</a:t>
-            </a:r>
-            <a:br>
-              <a:rPr lang="it-IT" dirty="0"/>
-            </a:br>
-            <a:r>
-              <a:rPr lang="it-IT" dirty="0"/>
-              <a:t>- </a:t>
-            </a:r>
-            <a:r>
-              <a:rPr lang="it-IT" dirty="0" err="1">
-                <a:hlinkClick r:id="rId6"/>
-              </a:rPr>
-              <a:t>numpy</a:t>
-            </a:r>
-            <a:r>
-              <a:rPr lang="it-IT" dirty="0"/>
-              <a:t> </a:t>
-            </a:r>
-            <a:br>
-              <a:rPr lang="it-IT" dirty="0"/>
-            </a:br>
-            <a:r>
-              <a:rPr lang="it-IT" dirty="0"/>
-              <a:t>- </a:t>
-            </a:r>
-            <a:r>
-              <a:rPr lang="it-IT" dirty="0" err="1">
-                <a:hlinkClick r:id="rId7"/>
-              </a:rPr>
-              <a:t>scikit-learn</a:t>
-            </a:r>
-            <a:br>
-              <a:rPr lang="it-IT" dirty="0"/>
-            </a:br>
-            <a:r>
-              <a:rPr lang="it-IT" dirty="0"/>
-              <a:t>- </a:t>
-            </a:r>
-            <a:r>
-              <a:rPr lang="it-IT" dirty="0" err="1">
-                <a:hlinkClick r:id="rId8"/>
-              </a:rPr>
-              <a:t>python_speech_features</a:t>
-            </a:r>
-            <a:endParaRPr lang="it-IT" dirty="0"/>
-          </a:p>
-        </p:txBody>
-      </p:sp>
     </p:spTree>
     <p:extLst>
       <p:ext uri="{BB962C8B-B14F-4D97-AF65-F5344CB8AC3E}">
@@ -10481,187 +11232,6 @@
 <file path=ppt/slides/slide16.xml><?xml version="1.0" encoding="utf-8"?>
 <p:sld xmlns:a="http://schemas.openxmlformats.org/drawingml/2006/main" xmlns:r="http://schemas.openxmlformats.org/officeDocument/2006/relationships" xmlns:p="http://schemas.openxmlformats.org/presentationml/2006/main">
   <p:cSld>
-    <p:spTree>
-      <p:nvGrpSpPr>
-        <p:cNvPr id="1" name=""/>
-        <p:cNvGrpSpPr/>
-        <p:nvPr/>
-      </p:nvGrpSpPr>
-      <p:grpSpPr>
-        <a:xfrm>
-          <a:off x="0" y="0"/>
-          <a:ext cx="0" cy="0"/>
-          <a:chOff x="0" y="0"/>
-          <a:chExt cx="0" cy="0"/>
-        </a:xfrm>
-      </p:grpSpPr>
-      <p:sp>
-        <p:nvSpPr>
-          <p:cNvPr id="2" name="Title 1">
-            <a:extLst>
-              <a:ext uri="{FF2B5EF4-FFF2-40B4-BE49-F238E27FC236}">
-                <a16:creationId xmlns:a16="http://schemas.microsoft.com/office/drawing/2014/main" id="{A8568D91-2EF6-4AF0-A7EB-941E9690FACA}"/>
-              </a:ext>
-            </a:extLst>
-          </p:cNvPr>
-          <p:cNvSpPr>
-            <a:spLocks noGrp="1"/>
-          </p:cNvSpPr>
-          <p:nvPr>
-            <p:ph type="title"/>
-          </p:nvPr>
-        </p:nvSpPr>
-        <p:spPr/>
-        <p:txBody>
-          <a:bodyPr/>
-          <a:lstStyle/>
-          <a:p>
-            <a:r>
-              <a:rPr lang="en-US" dirty="0">
-                <a:effectLst>
-                  <a:glow rad="38100">
-                    <a:prstClr val="black">
-                      <a:lumMod val="65000"/>
-                      <a:lumOff val="35000"/>
-                      <a:alpha val="40000"/>
-                    </a:prstClr>
-                  </a:glow>
-                  <a:outerShdw blurRad="28575" dist="38100" dir="14040000" algn="tl" rotWithShape="0">
-                    <a:srgbClr val="000000">
-                      <a:alpha val="25000"/>
-                    </a:srgbClr>
-                  </a:outerShdw>
-                </a:effectLst>
-              </a:rPr>
-              <a:t>Open point</a:t>
-            </a:r>
-            <a:endParaRPr lang="en-US" dirty="0"/>
-          </a:p>
-        </p:txBody>
-      </p:sp>
-      <p:sp>
-        <p:nvSpPr>
-          <p:cNvPr id="3" name="Content Placeholder 2">
-            <a:extLst>
-              <a:ext uri="{FF2B5EF4-FFF2-40B4-BE49-F238E27FC236}">
-                <a16:creationId xmlns:a16="http://schemas.microsoft.com/office/drawing/2014/main" id="{4FACE9E4-022F-4EF4-880D-598587B3CA7E}"/>
-              </a:ext>
-            </a:extLst>
-          </p:cNvPr>
-          <p:cNvSpPr>
-            <a:spLocks noGrp="1"/>
-          </p:cNvSpPr>
-          <p:nvPr>
-            <p:ph idx="1"/>
-          </p:nvPr>
-        </p:nvSpPr>
-        <p:spPr/>
-        <p:txBody>
-          <a:bodyPr/>
-          <a:lstStyle/>
-          <a:p>
-            <a:r>
-              <a:rPr lang="it-IT" dirty="0">
-                <a:effectLst>
-                  <a:glow rad="38100">
-                    <a:prstClr val="black">
-                      <a:lumMod val="50000"/>
-                      <a:lumOff val="50000"/>
-                      <a:alpha val="20000"/>
-                    </a:prstClr>
-                  </a:glow>
-                </a:effectLst>
-              </a:rPr>
-              <a:t>Massimizzare l’affidabilità dei modelli con tuning di iper parametri e miglioramento dell’estrazione delle feature
-Aggiungere una soglia di </a:t>
-            </a:r>
-            <a:r>
-              <a:rPr lang="it-IT" dirty="0" err="1">
-                <a:effectLst>
-                  <a:glow rad="38100">
-                    <a:prstClr val="black">
-                      <a:lumMod val="50000"/>
-                      <a:lumOff val="50000"/>
-                      <a:alpha val="20000"/>
-                    </a:prstClr>
-                  </a:glow>
-                </a:effectLst>
-              </a:rPr>
-              <a:t>affidabiilità</a:t>
-            </a:r>
-            <a:r>
-              <a:rPr lang="it-IT" dirty="0">
-                <a:effectLst>
-                  <a:glow rad="38100">
-                    <a:prstClr val="black">
-                      <a:lumMod val="50000"/>
-                      <a:lumOff val="50000"/>
-                      <a:alpha val="20000"/>
-                    </a:prstClr>
-                  </a:glow>
-                </a:effectLst>
-              </a:rPr>
-              <a:t> per permettere anche la speaker </a:t>
-            </a:r>
-            <a:r>
-              <a:rPr lang="it-IT" dirty="0" err="1">
-                <a:effectLst>
-                  <a:glow rad="38100">
-                    <a:prstClr val="black">
-                      <a:lumMod val="50000"/>
-                      <a:lumOff val="50000"/>
-                      <a:alpha val="20000"/>
-                    </a:prstClr>
-                  </a:glow>
-                </a:effectLst>
-              </a:rPr>
-              <a:t>verification</a:t>
-            </a:r>
-            <a:r>
-              <a:rPr lang="it-IT" dirty="0">
-                <a:effectLst>
-                  <a:glow rad="38100">
-                    <a:prstClr val="black">
-                      <a:lumMod val="50000"/>
-                      <a:lumOff val="50000"/>
-                      <a:alpha val="20000"/>
-                    </a:prstClr>
-                  </a:glow>
-                </a:effectLst>
-              </a:rPr>
-              <a:t> in seguito all’identificazione
-Creare od utilizzare un dataset in lingua italiana</a:t>
-            </a:r>
-            <a:endParaRPr lang="en-US" dirty="0">
-              <a:effectLst>
-                <a:glow rad="38100">
-                  <a:prstClr val="black">
-                    <a:lumMod val="50000"/>
-                    <a:lumOff val="50000"/>
-                    <a:alpha val="20000"/>
-                  </a:prstClr>
-                </a:glow>
-              </a:effectLst>
-            </a:endParaRPr>
-          </a:p>
-        </p:txBody>
-      </p:sp>
-    </p:spTree>
-    <p:extLst>
-      <p:ext uri="{BB962C8B-B14F-4D97-AF65-F5344CB8AC3E}">
-        <p14:creationId xmlns:p14="http://schemas.microsoft.com/office/powerpoint/2010/main" val="1103747572"/>
-      </p:ext>
-    </p:extLst>
-  </p:cSld>
-  <p:clrMapOvr>
-    <a:masterClrMapping/>
-  </p:clrMapOvr>
-</p:sld>
-</file>
-
-<file path=ppt/slides/slide2.xml><?xml version="1.0" encoding="utf-8"?>
-<p:sld xmlns:a="http://schemas.openxmlformats.org/drawingml/2006/main" xmlns:r="http://schemas.openxmlformats.org/officeDocument/2006/relationships" xmlns:p="http://schemas.openxmlformats.org/presentationml/2006/main">
-  <p:cSld>
     <p:bg>
       <p:bgPr>
         <a:blipFill rotWithShape="1">
@@ -10704,761 +11274,6 @@
           <p:cNvPr id="8" name="Rectangle 7">
             <a:extLst>
               <a:ext uri="{FF2B5EF4-FFF2-40B4-BE49-F238E27FC236}">
-                <a16:creationId xmlns:a16="http://schemas.microsoft.com/office/drawing/2014/main" id="{5690F3EE-0CD1-4520-B020-4E1DF3141C74}"/>
-              </a:ext>
-              <a:ext uri="{C183D7F6-B498-43B3-948B-1728B52AA6E4}">
-                <adec:decorative xmlns:adec="http://schemas.microsoft.com/office/drawing/2017/decorative" val="1"/>
-              </a:ext>
-            </a:extLst>
-          </p:cNvPr>
-          <p:cNvSpPr>
-            <a:spLocks noGrp="1" noRot="1" noChangeAspect="1" noMove="1" noResize="1" noEditPoints="1" noAdjustHandles="1" noChangeArrowheads="1" noChangeShapeType="1" noTextEdit="1"/>
-          </p:cNvSpPr>
-          <p:nvPr>
-            <p:extLst>
-              <p:ext uri="{386F3935-93C4-4BCD-93E2-E3B085C9AB24}">
-                <p16:designElem xmlns:p16="http://schemas.microsoft.com/office/powerpoint/2015/main" val="1"/>
-              </p:ext>
-            </p:extLst>
-          </p:nvPr>
-        </p:nvSpPr>
-        <p:spPr>
-          <a:xfrm>
-            <a:off x="0" y="-1"/>
-            <a:ext cx="12192000" cy="6858001"/>
-          </a:xfrm>
-          <a:prstGeom prst="rect">
-            <a:avLst/>
-          </a:prstGeom>
-          <a:solidFill>
-            <a:schemeClr val="bg2"/>
-          </a:solidFill>
-          <a:ln>
-            <a:noFill/>
-          </a:ln>
-        </p:spPr>
-        <p:style>
-          <a:lnRef idx="2">
-            <a:schemeClr val="accent1">
-              <a:shade val="50000"/>
-            </a:schemeClr>
-          </a:lnRef>
-          <a:fillRef idx="1">
-            <a:schemeClr val="accent1"/>
-          </a:fillRef>
-          <a:effectRef idx="0">
-            <a:schemeClr val="accent1"/>
-          </a:effectRef>
-          <a:fontRef idx="minor">
-            <a:schemeClr val="lt1"/>
-          </a:fontRef>
-        </p:style>
-        <p:txBody>
-          <a:bodyPr rtlCol="0" anchor="ctr"/>
-          <a:lstStyle/>
-          <a:p>
-            <a:pPr algn="ctr"/>
-            <a:endParaRPr lang="en-US" dirty="0"/>
-          </a:p>
-        </p:txBody>
-      </p:sp>
-      <p:sp useBgFill="1">
-        <p:nvSpPr>
-          <p:cNvPr id="10" name="Freeform: Shape 9">
-            <a:extLst>
-              <a:ext uri="{FF2B5EF4-FFF2-40B4-BE49-F238E27FC236}">
-                <a16:creationId xmlns:a16="http://schemas.microsoft.com/office/drawing/2014/main" id="{9EFDE1E9-7FE0-45CA-9DE2-237F77319A9F}"/>
-              </a:ext>
-              <a:ext uri="{C183D7F6-B498-43B3-948B-1728B52AA6E4}">
-                <adec:decorative xmlns:adec="http://schemas.microsoft.com/office/drawing/2017/decorative" val="1"/>
-              </a:ext>
-            </a:extLst>
-          </p:cNvPr>
-          <p:cNvSpPr>
-            <a:spLocks noGrp="1" noRot="1" noChangeAspect="1" noMove="1" noResize="1" noEditPoints="1" noAdjustHandles="1" noChangeArrowheads="1" noChangeShapeType="1" noTextEdit="1"/>
-          </p:cNvSpPr>
-          <p:nvPr>
-            <p:extLst>
-              <p:ext uri="{386F3935-93C4-4BCD-93E2-E3B085C9AB24}">
-                <p16:designElem xmlns:p16="http://schemas.microsoft.com/office/powerpoint/2015/main" val="1"/>
-              </p:ext>
-            </p:extLst>
-          </p:nvPr>
-        </p:nvSpPr>
-        <p:spPr>
-          <a:xfrm>
-            <a:off x="0" y="-1"/>
-            <a:ext cx="12192000" cy="2270840"/>
-          </a:xfrm>
-          <a:custGeom>
-            <a:avLst/>
-            <a:gdLst>
-              <a:gd name="connsiteX0" fmla="*/ 0 w 12192000"/>
-              <a:gd name="connsiteY0" fmla="*/ 0 h 2270840"/>
-              <a:gd name="connsiteX1" fmla="*/ 12192000 w 12192000"/>
-              <a:gd name="connsiteY1" fmla="*/ 0 h 2270840"/>
-              <a:gd name="connsiteX2" fmla="*/ 12192000 w 12192000"/>
-              <a:gd name="connsiteY2" fmla="*/ 519831 h 2270840"/>
-              <a:gd name="connsiteX3" fmla="*/ 12192000 w 12192000"/>
-              <a:gd name="connsiteY3" fmla="*/ 744794 h 2270840"/>
-              <a:gd name="connsiteX4" fmla="*/ 12192000 w 12192000"/>
-              <a:gd name="connsiteY4" fmla="*/ 1754022 h 2270840"/>
-              <a:gd name="connsiteX5" fmla="*/ 11957522 w 12192000"/>
-              <a:gd name="connsiteY5" fmla="*/ 1797924 h 2270840"/>
-              <a:gd name="connsiteX6" fmla="*/ 11679973 w 12192000"/>
-              <a:gd name="connsiteY6" fmla="*/ 1847668 h 2270840"/>
-              <a:gd name="connsiteX7" fmla="*/ 11401197 w 12192000"/>
-              <a:gd name="connsiteY7" fmla="*/ 1896361 h 2270840"/>
-              <a:gd name="connsiteX8" fmla="*/ 11121192 w 12192000"/>
-              <a:gd name="connsiteY8" fmla="*/ 1938047 h 2270840"/>
-              <a:gd name="connsiteX9" fmla="*/ 10842416 w 12192000"/>
-              <a:gd name="connsiteY9" fmla="*/ 1980084 h 2270840"/>
-              <a:gd name="connsiteX10" fmla="*/ 10562411 w 12192000"/>
-              <a:gd name="connsiteY10" fmla="*/ 2019319 h 2270840"/>
-              <a:gd name="connsiteX11" fmla="*/ 10286091 w 12192000"/>
-              <a:gd name="connsiteY11" fmla="*/ 2052948 h 2270840"/>
-              <a:gd name="connsiteX12" fmla="*/ 10006086 w 12192000"/>
-              <a:gd name="connsiteY12" fmla="*/ 2084826 h 2270840"/>
-              <a:gd name="connsiteX13" fmla="*/ 9727310 w 12192000"/>
-              <a:gd name="connsiteY13" fmla="*/ 2113902 h 2270840"/>
-              <a:gd name="connsiteX14" fmla="*/ 9453445 w 12192000"/>
-              <a:gd name="connsiteY14" fmla="*/ 2139124 h 2270840"/>
-              <a:gd name="connsiteX15" fmla="*/ 9175897 w 12192000"/>
-              <a:gd name="connsiteY15" fmla="*/ 2164346 h 2270840"/>
-              <a:gd name="connsiteX16" fmla="*/ 8902033 w 12192000"/>
-              <a:gd name="connsiteY16" fmla="*/ 2185365 h 2270840"/>
-              <a:gd name="connsiteX17" fmla="*/ 8628169 w 12192000"/>
-              <a:gd name="connsiteY17" fmla="*/ 2201829 h 2270840"/>
-              <a:gd name="connsiteX18" fmla="*/ 8355533 w 12192000"/>
-              <a:gd name="connsiteY18" fmla="*/ 2218995 h 2270840"/>
-              <a:gd name="connsiteX19" fmla="*/ 8085353 w 12192000"/>
-              <a:gd name="connsiteY19" fmla="*/ 2233357 h 2270840"/>
-              <a:gd name="connsiteX20" fmla="*/ 7817629 w 12192000"/>
-              <a:gd name="connsiteY20" fmla="*/ 2243516 h 2270840"/>
-              <a:gd name="connsiteX21" fmla="*/ 7549905 w 12192000"/>
-              <a:gd name="connsiteY21" fmla="*/ 2252274 h 2270840"/>
-              <a:gd name="connsiteX22" fmla="*/ 7284638 w 12192000"/>
-              <a:gd name="connsiteY22" fmla="*/ 2260681 h 2270840"/>
-              <a:gd name="connsiteX23" fmla="*/ 7023055 w 12192000"/>
-              <a:gd name="connsiteY23" fmla="*/ 2264535 h 2270840"/>
-              <a:gd name="connsiteX24" fmla="*/ 6761472 w 12192000"/>
-              <a:gd name="connsiteY24" fmla="*/ 2268738 h 2270840"/>
-              <a:gd name="connsiteX25" fmla="*/ 6503573 w 12192000"/>
-              <a:gd name="connsiteY25" fmla="*/ 2270840 h 2270840"/>
-              <a:gd name="connsiteX26" fmla="*/ 6248130 w 12192000"/>
-              <a:gd name="connsiteY26" fmla="*/ 2268738 h 2270840"/>
-              <a:gd name="connsiteX27" fmla="*/ 5995144 w 12192000"/>
-              <a:gd name="connsiteY27" fmla="*/ 2268738 h 2270840"/>
-              <a:gd name="connsiteX28" fmla="*/ 5744613 w 12192000"/>
-              <a:gd name="connsiteY28" fmla="*/ 2264535 h 2270840"/>
-              <a:gd name="connsiteX29" fmla="*/ 5498995 w 12192000"/>
-              <a:gd name="connsiteY29" fmla="*/ 2258229 h 2270840"/>
-              <a:gd name="connsiteX30" fmla="*/ 5255834 w 12192000"/>
-              <a:gd name="connsiteY30" fmla="*/ 2252274 h 2270840"/>
-              <a:gd name="connsiteX31" fmla="*/ 5017584 w 12192000"/>
-              <a:gd name="connsiteY31" fmla="*/ 2245618 h 2270840"/>
-              <a:gd name="connsiteX32" fmla="*/ 4780562 w 12192000"/>
-              <a:gd name="connsiteY32" fmla="*/ 2235459 h 2270840"/>
-              <a:gd name="connsiteX33" fmla="*/ 4547227 w 12192000"/>
-              <a:gd name="connsiteY33" fmla="*/ 2224599 h 2270840"/>
-              <a:gd name="connsiteX34" fmla="*/ 4318800 w 12192000"/>
-              <a:gd name="connsiteY34" fmla="*/ 2214791 h 2270840"/>
-              <a:gd name="connsiteX35" fmla="*/ 3873004 w 12192000"/>
-              <a:gd name="connsiteY35" fmla="*/ 2187116 h 2270840"/>
-              <a:gd name="connsiteX36" fmla="*/ 3445628 w 12192000"/>
-              <a:gd name="connsiteY36" fmla="*/ 2157691 h 2270840"/>
-              <a:gd name="connsiteX37" fmla="*/ 3035446 w 12192000"/>
-              <a:gd name="connsiteY37" fmla="*/ 2126863 h 2270840"/>
-              <a:gd name="connsiteX38" fmla="*/ 2647370 w 12192000"/>
-              <a:gd name="connsiteY38" fmla="*/ 2092884 h 2270840"/>
-              <a:gd name="connsiteX39" fmla="*/ 2276487 w 12192000"/>
-              <a:gd name="connsiteY39" fmla="*/ 2057502 h 2270840"/>
-              <a:gd name="connsiteX40" fmla="*/ 1932621 w 12192000"/>
-              <a:gd name="connsiteY40" fmla="*/ 2019319 h 2270840"/>
-              <a:gd name="connsiteX41" fmla="*/ 1609634 w 12192000"/>
-              <a:gd name="connsiteY41" fmla="*/ 1981836 h 2270840"/>
-              <a:gd name="connsiteX42" fmla="*/ 1312435 w 12192000"/>
-              <a:gd name="connsiteY42" fmla="*/ 1944353 h 2270840"/>
-              <a:gd name="connsiteX43" fmla="*/ 1039799 w 12192000"/>
-              <a:gd name="connsiteY43" fmla="*/ 1908972 h 2270840"/>
-              <a:gd name="connsiteX44" fmla="*/ 797865 w 12192000"/>
-              <a:gd name="connsiteY44" fmla="*/ 1875342 h 2270840"/>
-              <a:gd name="connsiteX45" fmla="*/ 579265 w 12192000"/>
-              <a:gd name="connsiteY45" fmla="*/ 1843464 h 2270840"/>
-              <a:gd name="connsiteX46" fmla="*/ 395052 w 12192000"/>
-              <a:gd name="connsiteY46" fmla="*/ 1816841 h 2270840"/>
-              <a:gd name="connsiteX47" fmla="*/ 240312 w 12192000"/>
-              <a:gd name="connsiteY47" fmla="*/ 1791618 h 2270840"/>
-              <a:gd name="connsiteX48" fmla="*/ 27853 w 12192000"/>
-              <a:gd name="connsiteY48" fmla="*/ 1755537 h 2270840"/>
-              <a:gd name="connsiteX49" fmla="*/ 0 w 12192000"/>
-              <a:gd name="connsiteY49" fmla="*/ 1750824 h 2270840"/>
-              <a:gd name="connsiteX50" fmla="*/ 0 w 12192000"/>
-              <a:gd name="connsiteY50" fmla="*/ 744794 h 2270840"/>
-              <a:gd name="connsiteX51" fmla="*/ 0 w 12192000"/>
-              <a:gd name="connsiteY51" fmla="*/ 519831 h 2270840"/>
-            </a:gdLst>
-            <a:ahLst/>
-            <a:cxnLst>
-              <a:cxn ang="0">
-                <a:pos x="connsiteX0" y="connsiteY0"/>
-              </a:cxn>
-              <a:cxn ang="0">
-                <a:pos x="connsiteX1" y="connsiteY1"/>
-              </a:cxn>
-              <a:cxn ang="0">
-                <a:pos x="connsiteX2" y="connsiteY2"/>
-              </a:cxn>
-              <a:cxn ang="0">
-                <a:pos x="connsiteX3" y="connsiteY3"/>
-              </a:cxn>
-              <a:cxn ang="0">
-                <a:pos x="connsiteX4" y="connsiteY4"/>
-              </a:cxn>
-              <a:cxn ang="0">
-                <a:pos x="connsiteX5" y="connsiteY5"/>
-              </a:cxn>
-              <a:cxn ang="0">
-                <a:pos x="connsiteX6" y="connsiteY6"/>
-              </a:cxn>
-              <a:cxn ang="0">
-                <a:pos x="connsiteX7" y="connsiteY7"/>
-              </a:cxn>
-              <a:cxn ang="0">
-                <a:pos x="connsiteX8" y="connsiteY8"/>
-              </a:cxn>
-              <a:cxn ang="0">
-                <a:pos x="connsiteX9" y="connsiteY9"/>
-              </a:cxn>
-              <a:cxn ang="0">
-                <a:pos x="connsiteX10" y="connsiteY10"/>
-              </a:cxn>
-              <a:cxn ang="0">
-                <a:pos x="connsiteX11" y="connsiteY11"/>
-              </a:cxn>
-              <a:cxn ang="0">
-                <a:pos x="connsiteX12" y="connsiteY12"/>
-              </a:cxn>
-              <a:cxn ang="0">
-                <a:pos x="connsiteX13" y="connsiteY13"/>
-              </a:cxn>
-              <a:cxn ang="0">
-                <a:pos x="connsiteX14" y="connsiteY14"/>
-              </a:cxn>
-              <a:cxn ang="0">
-                <a:pos x="connsiteX15" y="connsiteY15"/>
-              </a:cxn>
-              <a:cxn ang="0">
-                <a:pos x="connsiteX16" y="connsiteY16"/>
-              </a:cxn>
-              <a:cxn ang="0">
-                <a:pos x="connsiteX17" y="connsiteY17"/>
-              </a:cxn>
-              <a:cxn ang="0">
-                <a:pos x="connsiteX18" y="connsiteY18"/>
-              </a:cxn>
-              <a:cxn ang="0">
-                <a:pos x="connsiteX19" y="connsiteY19"/>
-              </a:cxn>
-              <a:cxn ang="0">
-                <a:pos x="connsiteX20" y="connsiteY20"/>
-              </a:cxn>
-              <a:cxn ang="0">
-                <a:pos x="connsiteX21" y="connsiteY21"/>
-              </a:cxn>
-              <a:cxn ang="0">
-                <a:pos x="connsiteX22" y="connsiteY22"/>
-              </a:cxn>
-              <a:cxn ang="0">
-                <a:pos x="connsiteX23" y="connsiteY23"/>
-              </a:cxn>
-              <a:cxn ang="0">
-                <a:pos x="connsiteX24" y="connsiteY24"/>
-              </a:cxn>
-              <a:cxn ang="0">
-                <a:pos x="connsiteX25" y="connsiteY25"/>
-              </a:cxn>
-              <a:cxn ang="0">
-                <a:pos x="connsiteX26" y="connsiteY26"/>
-              </a:cxn>
-              <a:cxn ang="0">
-                <a:pos x="connsiteX27" y="connsiteY27"/>
-              </a:cxn>
-              <a:cxn ang="0">
-                <a:pos x="connsiteX28" y="connsiteY28"/>
-              </a:cxn>
-              <a:cxn ang="0">
-                <a:pos x="connsiteX29" y="connsiteY29"/>
-              </a:cxn>
-              <a:cxn ang="0">
-                <a:pos x="connsiteX30" y="connsiteY30"/>
-              </a:cxn>
-              <a:cxn ang="0">
-                <a:pos x="connsiteX31" y="connsiteY31"/>
-              </a:cxn>
-              <a:cxn ang="0">
-                <a:pos x="connsiteX32" y="connsiteY32"/>
-              </a:cxn>
-              <a:cxn ang="0">
-                <a:pos x="connsiteX33" y="connsiteY33"/>
-              </a:cxn>
-              <a:cxn ang="0">
-                <a:pos x="connsiteX34" y="connsiteY34"/>
-              </a:cxn>
-              <a:cxn ang="0">
-                <a:pos x="connsiteX35" y="connsiteY35"/>
-              </a:cxn>
-              <a:cxn ang="0">
-                <a:pos x="connsiteX36" y="connsiteY36"/>
-              </a:cxn>
-              <a:cxn ang="0">
-                <a:pos x="connsiteX37" y="connsiteY37"/>
-              </a:cxn>
-              <a:cxn ang="0">
-                <a:pos x="connsiteX38" y="connsiteY38"/>
-              </a:cxn>
-              <a:cxn ang="0">
-                <a:pos x="connsiteX39" y="connsiteY39"/>
-              </a:cxn>
-              <a:cxn ang="0">
-                <a:pos x="connsiteX40" y="connsiteY40"/>
-              </a:cxn>
-              <a:cxn ang="0">
-                <a:pos x="connsiteX41" y="connsiteY41"/>
-              </a:cxn>
-              <a:cxn ang="0">
-                <a:pos x="connsiteX42" y="connsiteY42"/>
-              </a:cxn>
-              <a:cxn ang="0">
-                <a:pos x="connsiteX43" y="connsiteY43"/>
-              </a:cxn>
-              <a:cxn ang="0">
-                <a:pos x="connsiteX44" y="connsiteY44"/>
-              </a:cxn>
-              <a:cxn ang="0">
-                <a:pos x="connsiteX45" y="connsiteY45"/>
-              </a:cxn>
-              <a:cxn ang="0">
-                <a:pos x="connsiteX46" y="connsiteY46"/>
-              </a:cxn>
-              <a:cxn ang="0">
-                <a:pos x="connsiteX47" y="connsiteY47"/>
-              </a:cxn>
-              <a:cxn ang="0">
-                <a:pos x="connsiteX48" y="connsiteY48"/>
-              </a:cxn>
-              <a:cxn ang="0">
-                <a:pos x="connsiteX49" y="connsiteY49"/>
-              </a:cxn>
-              <a:cxn ang="0">
-                <a:pos x="connsiteX50" y="connsiteY50"/>
-              </a:cxn>
-              <a:cxn ang="0">
-                <a:pos x="connsiteX51" y="connsiteY51"/>
-              </a:cxn>
-            </a:cxnLst>
-            <a:rect l="l" t="t" r="r" b="b"/>
-            <a:pathLst>
-              <a:path w="12192000" h="2270840">
-                <a:moveTo>
-                  <a:pt x="0" y="0"/>
-                </a:moveTo>
-                <a:lnTo>
-                  <a:pt x="12192000" y="0"/>
-                </a:lnTo>
-                <a:lnTo>
-                  <a:pt x="12192000" y="519831"/>
-                </a:lnTo>
-                <a:lnTo>
-                  <a:pt x="12192000" y="744794"/>
-                </a:lnTo>
-                <a:lnTo>
-                  <a:pt x="12192000" y="1754022"/>
-                </a:lnTo>
-                <a:lnTo>
-                  <a:pt x="11957522" y="1797924"/>
-                </a:lnTo>
-                <a:lnTo>
-                  <a:pt x="11679973" y="1847668"/>
-                </a:lnTo>
-                <a:lnTo>
-                  <a:pt x="11401197" y="1896361"/>
-                </a:lnTo>
-                <a:lnTo>
-                  <a:pt x="11121192" y="1938047"/>
-                </a:lnTo>
-                <a:lnTo>
-                  <a:pt x="10842416" y="1980084"/>
-                </a:lnTo>
-                <a:lnTo>
-                  <a:pt x="10562411" y="2019319"/>
-                </a:lnTo>
-                <a:lnTo>
-                  <a:pt x="10286091" y="2052948"/>
-                </a:lnTo>
-                <a:lnTo>
-                  <a:pt x="10006086" y="2084826"/>
-                </a:lnTo>
-                <a:lnTo>
-                  <a:pt x="9727310" y="2113902"/>
-                </a:lnTo>
-                <a:lnTo>
-                  <a:pt x="9453445" y="2139124"/>
-                </a:lnTo>
-                <a:lnTo>
-                  <a:pt x="9175897" y="2164346"/>
-                </a:lnTo>
-                <a:lnTo>
-                  <a:pt x="8902033" y="2185365"/>
-                </a:lnTo>
-                <a:lnTo>
-                  <a:pt x="8628169" y="2201829"/>
-                </a:lnTo>
-                <a:lnTo>
-                  <a:pt x="8355533" y="2218995"/>
-                </a:lnTo>
-                <a:lnTo>
-                  <a:pt x="8085353" y="2233357"/>
-                </a:lnTo>
-                <a:lnTo>
-                  <a:pt x="7817629" y="2243516"/>
-                </a:lnTo>
-                <a:lnTo>
-                  <a:pt x="7549905" y="2252274"/>
-                </a:lnTo>
-                <a:lnTo>
-                  <a:pt x="7284638" y="2260681"/>
-                </a:lnTo>
-                <a:lnTo>
-                  <a:pt x="7023055" y="2264535"/>
-                </a:lnTo>
-                <a:lnTo>
-                  <a:pt x="6761472" y="2268738"/>
-                </a:lnTo>
-                <a:lnTo>
-                  <a:pt x="6503573" y="2270840"/>
-                </a:lnTo>
-                <a:lnTo>
-                  <a:pt x="6248130" y="2268738"/>
-                </a:lnTo>
-                <a:lnTo>
-                  <a:pt x="5995144" y="2268738"/>
-                </a:lnTo>
-                <a:lnTo>
-                  <a:pt x="5744613" y="2264535"/>
-                </a:lnTo>
-                <a:lnTo>
-                  <a:pt x="5498995" y="2258229"/>
-                </a:lnTo>
-                <a:lnTo>
-                  <a:pt x="5255834" y="2252274"/>
-                </a:lnTo>
-                <a:lnTo>
-                  <a:pt x="5017584" y="2245618"/>
-                </a:lnTo>
-                <a:lnTo>
-                  <a:pt x="4780562" y="2235459"/>
-                </a:lnTo>
-                <a:lnTo>
-                  <a:pt x="4547227" y="2224599"/>
-                </a:lnTo>
-                <a:lnTo>
-                  <a:pt x="4318800" y="2214791"/>
-                </a:lnTo>
-                <a:lnTo>
-                  <a:pt x="3873004" y="2187116"/>
-                </a:lnTo>
-                <a:lnTo>
-                  <a:pt x="3445628" y="2157691"/>
-                </a:lnTo>
-                <a:lnTo>
-                  <a:pt x="3035446" y="2126863"/>
-                </a:lnTo>
-                <a:lnTo>
-                  <a:pt x="2647370" y="2092884"/>
-                </a:lnTo>
-                <a:lnTo>
-                  <a:pt x="2276487" y="2057502"/>
-                </a:lnTo>
-                <a:lnTo>
-                  <a:pt x="1932621" y="2019319"/>
-                </a:lnTo>
-                <a:lnTo>
-                  <a:pt x="1609634" y="1981836"/>
-                </a:lnTo>
-                <a:lnTo>
-                  <a:pt x="1312435" y="1944353"/>
-                </a:lnTo>
-                <a:lnTo>
-                  <a:pt x="1039799" y="1908972"/>
-                </a:lnTo>
-                <a:lnTo>
-                  <a:pt x="797865" y="1875342"/>
-                </a:lnTo>
-                <a:lnTo>
-                  <a:pt x="579265" y="1843464"/>
-                </a:lnTo>
-                <a:lnTo>
-                  <a:pt x="395052" y="1816841"/>
-                </a:lnTo>
-                <a:lnTo>
-                  <a:pt x="240312" y="1791618"/>
-                </a:lnTo>
-                <a:lnTo>
-                  <a:pt x="27853" y="1755537"/>
-                </a:lnTo>
-                <a:lnTo>
-                  <a:pt x="0" y="1750824"/>
-                </a:lnTo>
-                <a:lnTo>
-                  <a:pt x="0" y="744794"/>
-                </a:lnTo>
-                <a:lnTo>
-                  <a:pt x="0" y="519831"/>
-                </a:lnTo>
-                <a:close/>
-              </a:path>
-            </a:pathLst>
-          </a:custGeom>
-          <a:ln w="44450">
-            <a:gradFill>
-              <a:gsLst>
-                <a:gs pos="0">
-                  <a:schemeClr val="bg2">
-                    <a:alpha val="65000"/>
-                  </a:schemeClr>
-                </a:gs>
-                <a:gs pos="98000">
-                  <a:schemeClr val="bg2">
-                    <a:lumMod val="75000"/>
-                    <a:alpha val="55000"/>
-                  </a:schemeClr>
-                </a:gs>
-              </a:gsLst>
-              <a:lin ang="5400000" scaled="1"/>
-            </a:gradFill>
-          </a:ln>
-          <a:effectLst>
-            <a:outerShdw blurRad="50800" dist="38100" dir="5400000" algn="t" rotWithShape="0">
-              <a:prstClr val="black">
-                <a:alpha val="50000"/>
-              </a:prstClr>
-            </a:outerShdw>
-          </a:effectLst>
-        </p:spPr>
-        <p:style>
-          <a:lnRef idx="2">
-            <a:schemeClr val="accent1">
-              <a:shade val="50000"/>
-            </a:schemeClr>
-          </a:lnRef>
-          <a:fillRef idx="1003">
-            <a:schemeClr val="dk2"/>
-          </a:fillRef>
-          <a:effectRef idx="0">
-            <a:schemeClr val="accent1"/>
-          </a:effectRef>
-          <a:fontRef idx="minor">
-            <a:schemeClr val="lt1"/>
-          </a:fontRef>
-        </p:style>
-        <p:txBody>
-          <a:bodyPr wrap="square" rtlCol="0" anchor="ctr">
-            <a:noAutofit/>
-          </a:bodyPr>
-          <a:lstStyle/>
-          <a:p>
-            <a:pPr algn="ctr"/>
-            <a:endParaRPr lang="en-US" dirty="0"/>
-          </a:p>
-        </p:txBody>
-      </p:sp>
-      <p:sp>
-        <p:nvSpPr>
-          <p:cNvPr id="2" name="Title 1">
-            <a:extLst>
-              <a:ext uri="{FF2B5EF4-FFF2-40B4-BE49-F238E27FC236}">
-                <a16:creationId xmlns:a16="http://schemas.microsoft.com/office/drawing/2014/main" id="{5A70EDA7-1F25-4772-9771-2300E44218B8}"/>
-              </a:ext>
-            </a:extLst>
-          </p:cNvPr>
-          <p:cNvSpPr>
-            <a:spLocks noGrp="1"/>
-          </p:cNvSpPr>
-          <p:nvPr>
-            <p:ph type="title"/>
-          </p:nvPr>
-        </p:nvSpPr>
-        <p:spPr>
-          <a:xfrm>
-            <a:off x="1141413" y="609600"/>
-            <a:ext cx="9905998" cy="1173480"/>
-          </a:xfrm>
-        </p:spPr>
-        <p:txBody>
-          <a:bodyPr>
-            <a:normAutofit/>
-          </a:bodyPr>
-          <a:lstStyle/>
-          <a:p>
-            <a:pPr algn="ctr"/>
-            <a:r>
-              <a:rPr lang="it-IT" dirty="0">
-                <a:effectLst>
-                  <a:glow rad="38100">
-                    <a:prstClr val="black">
-                      <a:lumMod val="65000"/>
-                      <a:lumOff val="35000"/>
-                      <a:alpha val="40000"/>
-                    </a:prstClr>
-                  </a:glow>
-                  <a:outerShdw blurRad="28575" dist="38100" dir="14040000" algn="tl" rotWithShape="0">
-                    <a:srgbClr val="000000">
-                      <a:alpha val="25000"/>
-                    </a:srgbClr>
-                  </a:outerShdw>
-                </a:effectLst>
-              </a:rPr>
-              <a:t>Obiettivi</a:t>
-            </a:r>
-            <a:endParaRPr lang="it-IT" dirty="0"/>
-          </a:p>
-        </p:txBody>
-      </p:sp>
-      <p:sp>
-        <p:nvSpPr>
-          <p:cNvPr id="3" name="Content Placeholder 2">
-            <a:extLst>
-              <a:ext uri="{FF2B5EF4-FFF2-40B4-BE49-F238E27FC236}">
-                <a16:creationId xmlns:a16="http://schemas.microsoft.com/office/drawing/2014/main" id="{EED73C6E-90E9-4CBB-8A7C-11FF43A837A0}"/>
-              </a:ext>
-            </a:extLst>
-          </p:cNvPr>
-          <p:cNvSpPr>
-            <a:spLocks noGrp="1"/>
-          </p:cNvSpPr>
-          <p:nvPr>
-            <p:ph idx="1"/>
-          </p:nvPr>
-        </p:nvSpPr>
-        <p:spPr>
-          <a:xfrm>
-            <a:off x="1141413" y="2666999"/>
-            <a:ext cx="9905998" cy="3124201"/>
-          </a:xfrm>
-        </p:spPr>
-        <p:txBody>
-          <a:bodyPr>
-            <a:normAutofit/>
-          </a:bodyPr>
-          <a:lstStyle/>
-          <a:p>
-            <a:r>
-              <a:rPr lang="it-IT" dirty="0">
-                <a:effectLst>
-                  <a:glow rad="38100">
-                    <a:prstClr val="black">
-                      <a:lumMod val="50000"/>
-                      <a:lumOff val="50000"/>
-                      <a:alpha val="20000"/>
-                    </a:prstClr>
-                  </a:glow>
-                  <a:outerShdw blurRad="44450" dist="12700" dir="13860000" algn="tl" rotWithShape="0">
-                    <a:srgbClr val="000000">
-                      <a:alpha val="20000"/>
-                    </a:srgbClr>
-                  </a:outerShdw>
-                </a:effectLst>
-              </a:rPr>
-              <a:t>Comparazione e ottimizzazione dell'attuale stato dell'arte sulla speaker verification, su più modelli di machine learning e misurarne le performance</a:t>
-            </a:r>
-          </a:p>
-          <a:p>
-            <a:pPr>
-              <a:buClr>
-                <a:srgbClr val="FFFFFF"/>
-              </a:buClr>
-            </a:pPr>
-            <a:r>
-              <a:rPr lang="it-IT" dirty="0">
-                <a:effectLst>
-                  <a:glow rad="38100">
-                    <a:prstClr val="black">
-                      <a:lumMod val="50000"/>
-                      <a:lumOff val="50000"/>
-                      <a:alpha val="20000"/>
-                    </a:prstClr>
-                  </a:glow>
-                  <a:outerShdw blurRad="44450" dist="12700" dir="13860000" algn="tl" rotWithShape="0">
-                    <a:srgbClr val="000000">
-                      <a:alpha val="20000"/>
-                    </a:srgbClr>
-                  </a:outerShdw>
-                </a:effectLst>
-              </a:rPr>
-              <a:t>Valutazione sulla possibilità di un utilizzo di questa tecnologia in ambito probatorio</a:t>
-            </a:r>
-          </a:p>
-        </p:txBody>
-      </p:sp>
-    </p:spTree>
-    <p:extLst>
-      <p:ext uri="{BB962C8B-B14F-4D97-AF65-F5344CB8AC3E}">
-        <p14:creationId xmlns:p14="http://schemas.microsoft.com/office/powerpoint/2010/main" val="3424013670"/>
-      </p:ext>
-    </p:extLst>
-  </p:cSld>
-  <p:clrMapOvr>
-    <a:masterClrMapping/>
-  </p:clrMapOvr>
-</p:sld>
-</file>
-
-<file path=ppt/slides/slide3.xml><?xml version="1.0" encoding="utf-8"?>
-<p:sld xmlns:a="http://schemas.openxmlformats.org/drawingml/2006/main" xmlns:r="http://schemas.openxmlformats.org/officeDocument/2006/relationships" xmlns:p="http://schemas.openxmlformats.org/presentationml/2006/main">
-  <p:cSld>
-    <p:bg>
-      <p:bgPr>
-        <a:blipFill rotWithShape="1">
-          <a:blip r:embed="rId2">
-            <a:duotone>
-              <a:schemeClr val="bg2">
-                <a:shade val="28000"/>
-                <a:satMod val="94000"/>
-                <a:lumMod val="20000"/>
-              </a:schemeClr>
-              <a:schemeClr val="bg2">
-                <a:tint val="94000"/>
-                <a:shade val="84000"/>
-                <a:satMod val="148000"/>
-                <a:lumMod val="114000"/>
-              </a:schemeClr>
-            </a:duotone>
-          </a:blip>
-          <a:stretch/>
-        </a:blipFill>
-        <a:effectLst/>
-      </p:bgPr>
-    </p:bg>
-    <p:spTree>
-      <p:nvGrpSpPr>
-        <p:cNvPr id="1" name=""/>
-        <p:cNvGrpSpPr/>
-        <p:nvPr/>
-      </p:nvGrpSpPr>
-      <p:grpSpPr>
-        <a:xfrm>
-          <a:off x="0" y="0"/>
-          <a:ext cx="0" cy="0"/>
-          <a:chOff x="0" y="0"/>
-          <a:chExt cx="0" cy="0"/>
-        </a:xfrm>
-      </p:grpSpPr>
-      <p:sp>
-        <p:nvSpPr>
-          <p:cNvPr id="8" name="Rectangle 7">
-            <a:extLst>
-              <a:ext uri="{FF2B5EF4-FFF2-40B4-BE49-F238E27FC236}">
                 <a16:creationId xmlns:a16="http://schemas.microsoft.com/office/drawing/2014/main" id="{5BBD3ED2-B0E6-45A2-ABD5-ECF31BC37C2E}"/>
               </a:ext>
               <a:ext uri="{C183D7F6-B498-43B3-948B-1728B52AA6E4}">
@@ -11513,7 +11328,7 @@
           <a:lstStyle/>
           <a:p>
             <a:pPr algn="ctr"/>
-            <a:endParaRPr lang="en-US" dirty="0"/>
+            <a:endParaRPr lang="en-US"/>
           </a:p>
         </p:txBody>
       </p:sp>
@@ -11600,7 +11415,7 @@
           <a:lstStyle/>
           <a:p>
             <a:pPr algn="ctr"/>
-            <a:endParaRPr lang="en-US" dirty="0"/>
+            <a:endParaRPr lang="en-US"/>
           </a:p>
         </p:txBody>
       </p:sp>
@@ -12125,6 +11940,1654 @@
           <a:lstStyle/>
           <a:p>
             <a:pPr algn="ctr"/>
+            <a:endParaRPr lang="en-US"/>
+          </a:p>
+        </p:txBody>
+      </p:sp>
+      <p:sp>
+        <p:nvSpPr>
+          <p:cNvPr id="2" name="Title 1">
+            <a:extLst>
+              <a:ext uri="{FF2B5EF4-FFF2-40B4-BE49-F238E27FC236}">
+                <a16:creationId xmlns:a16="http://schemas.microsoft.com/office/drawing/2014/main" id="{A8568D91-2EF6-4AF0-A7EB-941E9690FACA}"/>
+              </a:ext>
+            </a:extLst>
+          </p:cNvPr>
+          <p:cNvSpPr>
+            <a:spLocks noGrp="1"/>
+          </p:cNvSpPr>
+          <p:nvPr>
+            <p:ph type="title"/>
+          </p:nvPr>
+        </p:nvSpPr>
+        <p:spPr>
+          <a:xfrm>
+            <a:off x="962022" y="643467"/>
+            <a:ext cx="4340023" cy="5571064"/>
+          </a:xfrm>
+        </p:spPr>
+        <p:txBody>
+          <a:bodyPr anchor="ctr">
+            <a:normAutofit/>
+          </a:bodyPr>
+          <a:lstStyle/>
+          <a:p>
+            <a:r>
+              <a:rPr lang="en-US" sz="4400">
+                <a:effectLst>
+                  <a:glow rad="38100">
+                    <a:prstClr val="black">
+                      <a:lumMod val="65000"/>
+                      <a:lumOff val="35000"/>
+                      <a:alpha val="40000"/>
+                    </a:prstClr>
+                  </a:glow>
+                  <a:outerShdw blurRad="28575" dist="38100" dir="14040000" algn="tl" rotWithShape="0">
+                    <a:srgbClr val="000000">
+                      <a:alpha val="25000"/>
+                    </a:srgbClr>
+                  </a:outerShdw>
+                </a:effectLst>
+              </a:rPr>
+              <a:t>Open point</a:t>
+            </a:r>
+            <a:endParaRPr lang="en-US" sz="4400"/>
+          </a:p>
+        </p:txBody>
+      </p:sp>
+      <p:sp>
+        <p:nvSpPr>
+          <p:cNvPr id="3" name="Content Placeholder 2">
+            <a:extLst>
+              <a:ext uri="{FF2B5EF4-FFF2-40B4-BE49-F238E27FC236}">
+                <a16:creationId xmlns:a16="http://schemas.microsoft.com/office/drawing/2014/main" id="{4FACE9E4-022F-4EF4-880D-598587B3CA7E}"/>
+              </a:ext>
+            </a:extLst>
+          </p:cNvPr>
+          <p:cNvSpPr>
+            <a:spLocks noGrp="1"/>
+          </p:cNvSpPr>
+          <p:nvPr>
+            <p:ph idx="1"/>
+          </p:nvPr>
+        </p:nvSpPr>
+        <p:spPr>
+          <a:xfrm>
+            <a:off x="6708499" y="643467"/>
+            <a:ext cx="4521480" cy="5571064"/>
+          </a:xfrm>
+        </p:spPr>
+        <p:txBody>
+          <a:bodyPr>
+            <a:normAutofit/>
+          </a:bodyPr>
+          <a:lstStyle/>
+          <a:p>
+            <a:r>
+              <a:rPr lang="it-IT" dirty="0">
+                <a:effectLst>
+                  <a:glow rad="38100">
+                    <a:prstClr val="black">
+                      <a:lumMod val="50000"/>
+                      <a:lumOff val="50000"/>
+                      <a:alpha val="20000"/>
+                    </a:prstClr>
+                  </a:glow>
+                </a:effectLst>
+              </a:rPr>
+              <a:t>Massimizzare l’affidabilità dei modelli con tuning di iper parametri e miglioramento dell’estrazione delle feature
+Aggiungere una soglia di </a:t>
+            </a:r>
+            <a:r>
+              <a:rPr lang="it-IT" dirty="0" err="1">
+                <a:effectLst>
+                  <a:glow rad="38100">
+                    <a:prstClr val="black">
+                      <a:lumMod val="50000"/>
+                      <a:lumOff val="50000"/>
+                      <a:alpha val="20000"/>
+                    </a:prstClr>
+                  </a:glow>
+                </a:effectLst>
+              </a:rPr>
+              <a:t>affidabiilità</a:t>
+            </a:r>
+            <a:r>
+              <a:rPr lang="it-IT" dirty="0">
+                <a:effectLst>
+                  <a:glow rad="38100">
+                    <a:prstClr val="black">
+                      <a:lumMod val="50000"/>
+                      <a:lumOff val="50000"/>
+                      <a:alpha val="20000"/>
+                    </a:prstClr>
+                  </a:glow>
+                </a:effectLst>
+              </a:rPr>
+              <a:t> per permettere anche la speaker </a:t>
+            </a:r>
+            <a:r>
+              <a:rPr lang="it-IT" dirty="0" err="1">
+                <a:effectLst>
+                  <a:glow rad="38100">
+                    <a:prstClr val="black">
+                      <a:lumMod val="50000"/>
+                      <a:lumOff val="50000"/>
+                      <a:alpha val="20000"/>
+                    </a:prstClr>
+                  </a:glow>
+                </a:effectLst>
+              </a:rPr>
+              <a:t>verification</a:t>
+            </a:r>
+            <a:r>
+              <a:rPr lang="it-IT" dirty="0">
+                <a:effectLst>
+                  <a:glow rad="38100">
+                    <a:prstClr val="black">
+                      <a:lumMod val="50000"/>
+                      <a:lumOff val="50000"/>
+                      <a:alpha val="20000"/>
+                    </a:prstClr>
+                  </a:glow>
+                </a:effectLst>
+              </a:rPr>
+              <a:t> in seguito all’identificazione
+Creare od utilizzare un dataset in lingua italiana</a:t>
+            </a:r>
+            <a:endParaRPr lang="en-US" dirty="0">
+              <a:effectLst>
+                <a:glow rad="38100">
+                  <a:prstClr val="black">
+                    <a:lumMod val="50000"/>
+                    <a:lumOff val="50000"/>
+                    <a:alpha val="20000"/>
+                  </a:prstClr>
+                </a:glow>
+              </a:effectLst>
+            </a:endParaRPr>
+          </a:p>
+        </p:txBody>
+      </p:sp>
+    </p:spTree>
+    <p:extLst>
+      <p:ext uri="{BB962C8B-B14F-4D97-AF65-F5344CB8AC3E}">
+        <p14:creationId xmlns:p14="http://schemas.microsoft.com/office/powerpoint/2010/main" val="1103747572"/>
+      </p:ext>
+    </p:extLst>
+  </p:cSld>
+  <p:clrMapOvr>
+    <a:masterClrMapping/>
+  </p:clrMapOvr>
+</p:sld>
+</file>
+
+<file path=ppt/slides/slide2.xml><?xml version="1.0" encoding="utf-8"?>
+<p:sld xmlns:a="http://schemas.openxmlformats.org/drawingml/2006/main" xmlns:r="http://schemas.openxmlformats.org/officeDocument/2006/relationships" xmlns:p="http://schemas.openxmlformats.org/presentationml/2006/main">
+  <p:cSld>
+    <p:bg>
+      <p:bgPr>
+        <a:blipFill rotWithShape="1">
+          <a:blip r:embed="rId2">
+            <a:duotone>
+              <a:schemeClr val="bg2">
+                <a:shade val="28000"/>
+                <a:satMod val="94000"/>
+                <a:lumMod val="20000"/>
+              </a:schemeClr>
+              <a:schemeClr val="bg2">
+                <a:tint val="94000"/>
+                <a:shade val="84000"/>
+                <a:satMod val="148000"/>
+                <a:lumMod val="114000"/>
+              </a:schemeClr>
+            </a:duotone>
+          </a:blip>
+          <a:stretch/>
+        </a:blipFill>
+        <a:effectLst/>
+      </p:bgPr>
+    </p:bg>
+    <p:spTree>
+      <p:nvGrpSpPr>
+        <p:cNvPr id="1" name=""/>
+        <p:cNvGrpSpPr/>
+        <p:nvPr/>
+      </p:nvGrpSpPr>
+      <p:grpSpPr>
+        <a:xfrm>
+          <a:off x="0" y="0"/>
+          <a:ext cx="0" cy="0"/>
+          <a:chOff x="0" y="0"/>
+          <a:chExt cx="0" cy="0"/>
+        </a:xfrm>
+      </p:grpSpPr>
+      <p:sp>
+        <p:nvSpPr>
+          <p:cNvPr id="8" name="Rectangle 7">
+            <a:extLst>
+              <a:ext uri="{FF2B5EF4-FFF2-40B4-BE49-F238E27FC236}">
+                <a16:creationId xmlns:a16="http://schemas.microsoft.com/office/drawing/2014/main" id="{5690F3EE-0CD1-4520-B020-4E1DF3141C74}"/>
+              </a:ext>
+              <a:ext uri="{C183D7F6-B498-43B3-948B-1728B52AA6E4}">
+                <adec:decorative xmlns:adec="http://schemas.microsoft.com/office/drawing/2017/decorative" val="1"/>
+              </a:ext>
+            </a:extLst>
+          </p:cNvPr>
+          <p:cNvSpPr>
+            <a:spLocks noGrp="1" noRot="1" noChangeAspect="1" noMove="1" noResize="1" noEditPoints="1" noAdjustHandles="1" noChangeArrowheads="1" noChangeShapeType="1" noTextEdit="1"/>
+          </p:cNvSpPr>
+          <p:nvPr>
+            <p:extLst>
+              <p:ext uri="{386F3935-93C4-4BCD-93E2-E3B085C9AB24}">
+                <p16:designElem xmlns:p16="http://schemas.microsoft.com/office/powerpoint/2015/main" val="1"/>
+              </p:ext>
+            </p:extLst>
+          </p:nvPr>
+        </p:nvSpPr>
+        <p:spPr>
+          <a:xfrm>
+            <a:off x="0" y="-1"/>
+            <a:ext cx="12192000" cy="6858001"/>
+          </a:xfrm>
+          <a:prstGeom prst="rect">
+            <a:avLst/>
+          </a:prstGeom>
+          <a:solidFill>
+            <a:schemeClr val="bg2"/>
+          </a:solidFill>
+          <a:ln>
+            <a:noFill/>
+          </a:ln>
+        </p:spPr>
+        <p:style>
+          <a:lnRef idx="2">
+            <a:schemeClr val="accent1">
+              <a:shade val="50000"/>
+            </a:schemeClr>
+          </a:lnRef>
+          <a:fillRef idx="1">
+            <a:schemeClr val="accent1"/>
+          </a:fillRef>
+          <a:effectRef idx="0">
+            <a:schemeClr val="accent1"/>
+          </a:effectRef>
+          <a:fontRef idx="minor">
+            <a:schemeClr val="lt1"/>
+          </a:fontRef>
+        </p:style>
+        <p:txBody>
+          <a:bodyPr rtlCol="0" anchor="ctr"/>
+          <a:lstStyle/>
+          <a:p>
+            <a:pPr algn="ctr"/>
+            <a:endParaRPr lang="en-US" dirty="0"/>
+          </a:p>
+        </p:txBody>
+      </p:sp>
+      <p:sp useBgFill="1">
+        <p:nvSpPr>
+          <p:cNvPr id="10" name="Freeform: Shape 9">
+            <a:extLst>
+              <a:ext uri="{FF2B5EF4-FFF2-40B4-BE49-F238E27FC236}">
+                <a16:creationId xmlns:a16="http://schemas.microsoft.com/office/drawing/2014/main" id="{9EFDE1E9-7FE0-45CA-9DE2-237F77319A9F}"/>
+              </a:ext>
+              <a:ext uri="{C183D7F6-B498-43B3-948B-1728B52AA6E4}">
+                <adec:decorative xmlns:adec="http://schemas.microsoft.com/office/drawing/2017/decorative" val="1"/>
+              </a:ext>
+            </a:extLst>
+          </p:cNvPr>
+          <p:cNvSpPr>
+            <a:spLocks noGrp="1" noRot="1" noChangeAspect="1" noMove="1" noResize="1" noEditPoints="1" noAdjustHandles="1" noChangeArrowheads="1" noChangeShapeType="1" noTextEdit="1"/>
+          </p:cNvSpPr>
+          <p:nvPr>
+            <p:extLst>
+              <p:ext uri="{386F3935-93C4-4BCD-93E2-E3B085C9AB24}">
+                <p16:designElem xmlns:p16="http://schemas.microsoft.com/office/powerpoint/2015/main" val="1"/>
+              </p:ext>
+            </p:extLst>
+          </p:nvPr>
+        </p:nvSpPr>
+        <p:spPr>
+          <a:xfrm>
+            <a:off x="0" y="-1"/>
+            <a:ext cx="12192000" cy="2270840"/>
+          </a:xfrm>
+          <a:custGeom>
+            <a:avLst/>
+            <a:gdLst>
+              <a:gd name="connsiteX0" fmla="*/ 0 w 12192000"/>
+              <a:gd name="connsiteY0" fmla="*/ 0 h 2270840"/>
+              <a:gd name="connsiteX1" fmla="*/ 12192000 w 12192000"/>
+              <a:gd name="connsiteY1" fmla="*/ 0 h 2270840"/>
+              <a:gd name="connsiteX2" fmla="*/ 12192000 w 12192000"/>
+              <a:gd name="connsiteY2" fmla="*/ 519831 h 2270840"/>
+              <a:gd name="connsiteX3" fmla="*/ 12192000 w 12192000"/>
+              <a:gd name="connsiteY3" fmla="*/ 744794 h 2270840"/>
+              <a:gd name="connsiteX4" fmla="*/ 12192000 w 12192000"/>
+              <a:gd name="connsiteY4" fmla="*/ 1754022 h 2270840"/>
+              <a:gd name="connsiteX5" fmla="*/ 11957522 w 12192000"/>
+              <a:gd name="connsiteY5" fmla="*/ 1797924 h 2270840"/>
+              <a:gd name="connsiteX6" fmla="*/ 11679973 w 12192000"/>
+              <a:gd name="connsiteY6" fmla="*/ 1847668 h 2270840"/>
+              <a:gd name="connsiteX7" fmla="*/ 11401197 w 12192000"/>
+              <a:gd name="connsiteY7" fmla="*/ 1896361 h 2270840"/>
+              <a:gd name="connsiteX8" fmla="*/ 11121192 w 12192000"/>
+              <a:gd name="connsiteY8" fmla="*/ 1938047 h 2270840"/>
+              <a:gd name="connsiteX9" fmla="*/ 10842416 w 12192000"/>
+              <a:gd name="connsiteY9" fmla="*/ 1980084 h 2270840"/>
+              <a:gd name="connsiteX10" fmla="*/ 10562411 w 12192000"/>
+              <a:gd name="connsiteY10" fmla="*/ 2019319 h 2270840"/>
+              <a:gd name="connsiteX11" fmla="*/ 10286091 w 12192000"/>
+              <a:gd name="connsiteY11" fmla="*/ 2052948 h 2270840"/>
+              <a:gd name="connsiteX12" fmla="*/ 10006086 w 12192000"/>
+              <a:gd name="connsiteY12" fmla="*/ 2084826 h 2270840"/>
+              <a:gd name="connsiteX13" fmla="*/ 9727310 w 12192000"/>
+              <a:gd name="connsiteY13" fmla="*/ 2113902 h 2270840"/>
+              <a:gd name="connsiteX14" fmla="*/ 9453445 w 12192000"/>
+              <a:gd name="connsiteY14" fmla="*/ 2139124 h 2270840"/>
+              <a:gd name="connsiteX15" fmla="*/ 9175897 w 12192000"/>
+              <a:gd name="connsiteY15" fmla="*/ 2164346 h 2270840"/>
+              <a:gd name="connsiteX16" fmla="*/ 8902033 w 12192000"/>
+              <a:gd name="connsiteY16" fmla="*/ 2185365 h 2270840"/>
+              <a:gd name="connsiteX17" fmla="*/ 8628169 w 12192000"/>
+              <a:gd name="connsiteY17" fmla="*/ 2201829 h 2270840"/>
+              <a:gd name="connsiteX18" fmla="*/ 8355533 w 12192000"/>
+              <a:gd name="connsiteY18" fmla="*/ 2218995 h 2270840"/>
+              <a:gd name="connsiteX19" fmla="*/ 8085353 w 12192000"/>
+              <a:gd name="connsiteY19" fmla="*/ 2233357 h 2270840"/>
+              <a:gd name="connsiteX20" fmla="*/ 7817629 w 12192000"/>
+              <a:gd name="connsiteY20" fmla="*/ 2243516 h 2270840"/>
+              <a:gd name="connsiteX21" fmla="*/ 7549905 w 12192000"/>
+              <a:gd name="connsiteY21" fmla="*/ 2252274 h 2270840"/>
+              <a:gd name="connsiteX22" fmla="*/ 7284638 w 12192000"/>
+              <a:gd name="connsiteY22" fmla="*/ 2260681 h 2270840"/>
+              <a:gd name="connsiteX23" fmla="*/ 7023055 w 12192000"/>
+              <a:gd name="connsiteY23" fmla="*/ 2264535 h 2270840"/>
+              <a:gd name="connsiteX24" fmla="*/ 6761472 w 12192000"/>
+              <a:gd name="connsiteY24" fmla="*/ 2268738 h 2270840"/>
+              <a:gd name="connsiteX25" fmla="*/ 6503573 w 12192000"/>
+              <a:gd name="connsiteY25" fmla="*/ 2270840 h 2270840"/>
+              <a:gd name="connsiteX26" fmla="*/ 6248130 w 12192000"/>
+              <a:gd name="connsiteY26" fmla="*/ 2268738 h 2270840"/>
+              <a:gd name="connsiteX27" fmla="*/ 5995144 w 12192000"/>
+              <a:gd name="connsiteY27" fmla="*/ 2268738 h 2270840"/>
+              <a:gd name="connsiteX28" fmla="*/ 5744613 w 12192000"/>
+              <a:gd name="connsiteY28" fmla="*/ 2264535 h 2270840"/>
+              <a:gd name="connsiteX29" fmla="*/ 5498995 w 12192000"/>
+              <a:gd name="connsiteY29" fmla="*/ 2258229 h 2270840"/>
+              <a:gd name="connsiteX30" fmla="*/ 5255834 w 12192000"/>
+              <a:gd name="connsiteY30" fmla="*/ 2252274 h 2270840"/>
+              <a:gd name="connsiteX31" fmla="*/ 5017584 w 12192000"/>
+              <a:gd name="connsiteY31" fmla="*/ 2245618 h 2270840"/>
+              <a:gd name="connsiteX32" fmla="*/ 4780562 w 12192000"/>
+              <a:gd name="connsiteY32" fmla="*/ 2235459 h 2270840"/>
+              <a:gd name="connsiteX33" fmla="*/ 4547227 w 12192000"/>
+              <a:gd name="connsiteY33" fmla="*/ 2224599 h 2270840"/>
+              <a:gd name="connsiteX34" fmla="*/ 4318800 w 12192000"/>
+              <a:gd name="connsiteY34" fmla="*/ 2214791 h 2270840"/>
+              <a:gd name="connsiteX35" fmla="*/ 3873004 w 12192000"/>
+              <a:gd name="connsiteY35" fmla="*/ 2187116 h 2270840"/>
+              <a:gd name="connsiteX36" fmla="*/ 3445628 w 12192000"/>
+              <a:gd name="connsiteY36" fmla="*/ 2157691 h 2270840"/>
+              <a:gd name="connsiteX37" fmla="*/ 3035446 w 12192000"/>
+              <a:gd name="connsiteY37" fmla="*/ 2126863 h 2270840"/>
+              <a:gd name="connsiteX38" fmla="*/ 2647370 w 12192000"/>
+              <a:gd name="connsiteY38" fmla="*/ 2092884 h 2270840"/>
+              <a:gd name="connsiteX39" fmla="*/ 2276487 w 12192000"/>
+              <a:gd name="connsiteY39" fmla="*/ 2057502 h 2270840"/>
+              <a:gd name="connsiteX40" fmla="*/ 1932621 w 12192000"/>
+              <a:gd name="connsiteY40" fmla="*/ 2019319 h 2270840"/>
+              <a:gd name="connsiteX41" fmla="*/ 1609634 w 12192000"/>
+              <a:gd name="connsiteY41" fmla="*/ 1981836 h 2270840"/>
+              <a:gd name="connsiteX42" fmla="*/ 1312435 w 12192000"/>
+              <a:gd name="connsiteY42" fmla="*/ 1944353 h 2270840"/>
+              <a:gd name="connsiteX43" fmla="*/ 1039799 w 12192000"/>
+              <a:gd name="connsiteY43" fmla="*/ 1908972 h 2270840"/>
+              <a:gd name="connsiteX44" fmla="*/ 797865 w 12192000"/>
+              <a:gd name="connsiteY44" fmla="*/ 1875342 h 2270840"/>
+              <a:gd name="connsiteX45" fmla="*/ 579265 w 12192000"/>
+              <a:gd name="connsiteY45" fmla="*/ 1843464 h 2270840"/>
+              <a:gd name="connsiteX46" fmla="*/ 395052 w 12192000"/>
+              <a:gd name="connsiteY46" fmla="*/ 1816841 h 2270840"/>
+              <a:gd name="connsiteX47" fmla="*/ 240312 w 12192000"/>
+              <a:gd name="connsiteY47" fmla="*/ 1791618 h 2270840"/>
+              <a:gd name="connsiteX48" fmla="*/ 27853 w 12192000"/>
+              <a:gd name="connsiteY48" fmla="*/ 1755537 h 2270840"/>
+              <a:gd name="connsiteX49" fmla="*/ 0 w 12192000"/>
+              <a:gd name="connsiteY49" fmla="*/ 1750824 h 2270840"/>
+              <a:gd name="connsiteX50" fmla="*/ 0 w 12192000"/>
+              <a:gd name="connsiteY50" fmla="*/ 744794 h 2270840"/>
+              <a:gd name="connsiteX51" fmla="*/ 0 w 12192000"/>
+              <a:gd name="connsiteY51" fmla="*/ 519831 h 2270840"/>
+            </a:gdLst>
+            <a:ahLst/>
+            <a:cxnLst>
+              <a:cxn ang="0">
+                <a:pos x="connsiteX0" y="connsiteY0"/>
+              </a:cxn>
+              <a:cxn ang="0">
+                <a:pos x="connsiteX1" y="connsiteY1"/>
+              </a:cxn>
+              <a:cxn ang="0">
+                <a:pos x="connsiteX2" y="connsiteY2"/>
+              </a:cxn>
+              <a:cxn ang="0">
+                <a:pos x="connsiteX3" y="connsiteY3"/>
+              </a:cxn>
+              <a:cxn ang="0">
+                <a:pos x="connsiteX4" y="connsiteY4"/>
+              </a:cxn>
+              <a:cxn ang="0">
+                <a:pos x="connsiteX5" y="connsiteY5"/>
+              </a:cxn>
+              <a:cxn ang="0">
+                <a:pos x="connsiteX6" y="connsiteY6"/>
+              </a:cxn>
+              <a:cxn ang="0">
+                <a:pos x="connsiteX7" y="connsiteY7"/>
+              </a:cxn>
+              <a:cxn ang="0">
+                <a:pos x="connsiteX8" y="connsiteY8"/>
+              </a:cxn>
+              <a:cxn ang="0">
+                <a:pos x="connsiteX9" y="connsiteY9"/>
+              </a:cxn>
+              <a:cxn ang="0">
+                <a:pos x="connsiteX10" y="connsiteY10"/>
+              </a:cxn>
+              <a:cxn ang="0">
+                <a:pos x="connsiteX11" y="connsiteY11"/>
+              </a:cxn>
+              <a:cxn ang="0">
+                <a:pos x="connsiteX12" y="connsiteY12"/>
+              </a:cxn>
+              <a:cxn ang="0">
+                <a:pos x="connsiteX13" y="connsiteY13"/>
+              </a:cxn>
+              <a:cxn ang="0">
+                <a:pos x="connsiteX14" y="connsiteY14"/>
+              </a:cxn>
+              <a:cxn ang="0">
+                <a:pos x="connsiteX15" y="connsiteY15"/>
+              </a:cxn>
+              <a:cxn ang="0">
+                <a:pos x="connsiteX16" y="connsiteY16"/>
+              </a:cxn>
+              <a:cxn ang="0">
+                <a:pos x="connsiteX17" y="connsiteY17"/>
+              </a:cxn>
+              <a:cxn ang="0">
+                <a:pos x="connsiteX18" y="connsiteY18"/>
+              </a:cxn>
+              <a:cxn ang="0">
+                <a:pos x="connsiteX19" y="connsiteY19"/>
+              </a:cxn>
+              <a:cxn ang="0">
+                <a:pos x="connsiteX20" y="connsiteY20"/>
+              </a:cxn>
+              <a:cxn ang="0">
+                <a:pos x="connsiteX21" y="connsiteY21"/>
+              </a:cxn>
+              <a:cxn ang="0">
+                <a:pos x="connsiteX22" y="connsiteY22"/>
+              </a:cxn>
+              <a:cxn ang="0">
+                <a:pos x="connsiteX23" y="connsiteY23"/>
+              </a:cxn>
+              <a:cxn ang="0">
+                <a:pos x="connsiteX24" y="connsiteY24"/>
+              </a:cxn>
+              <a:cxn ang="0">
+                <a:pos x="connsiteX25" y="connsiteY25"/>
+              </a:cxn>
+              <a:cxn ang="0">
+                <a:pos x="connsiteX26" y="connsiteY26"/>
+              </a:cxn>
+              <a:cxn ang="0">
+                <a:pos x="connsiteX27" y="connsiteY27"/>
+              </a:cxn>
+              <a:cxn ang="0">
+                <a:pos x="connsiteX28" y="connsiteY28"/>
+              </a:cxn>
+              <a:cxn ang="0">
+                <a:pos x="connsiteX29" y="connsiteY29"/>
+              </a:cxn>
+              <a:cxn ang="0">
+                <a:pos x="connsiteX30" y="connsiteY30"/>
+              </a:cxn>
+              <a:cxn ang="0">
+                <a:pos x="connsiteX31" y="connsiteY31"/>
+              </a:cxn>
+              <a:cxn ang="0">
+                <a:pos x="connsiteX32" y="connsiteY32"/>
+              </a:cxn>
+              <a:cxn ang="0">
+                <a:pos x="connsiteX33" y="connsiteY33"/>
+              </a:cxn>
+              <a:cxn ang="0">
+                <a:pos x="connsiteX34" y="connsiteY34"/>
+              </a:cxn>
+              <a:cxn ang="0">
+                <a:pos x="connsiteX35" y="connsiteY35"/>
+              </a:cxn>
+              <a:cxn ang="0">
+                <a:pos x="connsiteX36" y="connsiteY36"/>
+              </a:cxn>
+              <a:cxn ang="0">
+                <a:pos x="connsiteX37" y="connsiteY37"/>
+              </a:cxn>
+              <a:cxn ang="0">
+                <a:pos x="connsiteX38" y="connsiteY38"/>
+              </a:cxn>
+              <a:cxn ang="0">
+                <a:pos x="connsiteX39" y="connsiteY39"/>
+              </a:cxn>
+              <a:cxn ang="0">
+                <a:pos x="connsiteX40" y="connsiteY40"/>
+              </a:cxn>
+              <a:cxn ang="0">
+                <a:pos x="connsiteX41" y="connsiteY41"/>
+              </a:cxn>
+              <a:cxn ang="0">
+                <a:pos x="connsiteX42" y="connsiteY42"/>
+              </a:cxn>
+              <a:cxn ang="0">
+                <a:pos x="connsiteX43" y="connsiteY43"/>
+              </a:cxn>
+              <a:cxn ang="0">
+                <a:pos x="connsiteX44" y="connsiteY44"/>
+              </a:cxn>
+              <a:cxn ang="0">
+                <a:pos x="connsiteX45" y="connsiteY45"/>
+              </a:cxn>
+              <a:cxn ang="0">
+                <a:pos x="connsiteX46" y="connsiteY46"/>
+              </a:cxn>
+              <a:cxn ang="0">
+                <a:pos x="connsiteX47" y="connsiteY47"/>
+              </a:cxn>
+              <a:cxn ang="0">
+                <a:pos x="connsiteX48" y="connsiteY48"/>
+              </a:cxn>
+              <a:cxn ang="0">
+                <a:pos x="connsiteX49" y="connsiteY49"/>
+              </a:cxn>
+              <a:cxn ang="0">
+                <a:pos x="connsiteX50" y="connsiteY50"/>
+              </a:cxn>
+              <a:cxn ang="0">
+                <a:pos x="connsiteX51" y="connsiteY51"/>
+              </a:cxn>
+            </a:cxnLst>
+            <a:rect l="l" t="t" r="r" b="b"/>
+            <a:pathLst>
+              <a:path w="12192000" h="2270840">
+                <a:moveTo>
+                  <a:pt x="0" y="0"/>
+                </a:moveTo>
+                <a:lnTo>
+                  <a:pt x="12192000" y="0"/>
+                </a:lnTo>
+                <a:lnTo>
+                  <a:pt x="12192000" y="519831"/>
+                </a:lnTo>
+                <a:lnTo>
+                  <a:pt x="12192000" y="744794"/>
+                </a:lnTo>
+                <a:lnTo>
+                  <a:pt x="12192000" y="1754022"/>
+                </a:lnTo>
+                <a:lnTo>
+                  <a:pt x="11957522" y="1797924"/>
+                </a:lnTo>
+                <a:lnTo>
+                  <a:pt x="11679973" y="1847668"/>
+                </a:lnTo>
+                <a:lnTo>
+                  <a:pt x="11401197" y="1896361"/>
+                </a:lnTo>
+                <a:lnTo>
+                  <a:pt x="11121192" y="1938047"/>
+                </a:lnTo>
+                <a:lnTo>
+                  <a:pt x="10842416" y="1980084"/>
+                </a:lnTo>
+                <a:lnTo>
+                  <a:pt x="10562411" y="2019319"/>
+                </a:lnTo>
+                <a:lnTo>
+                  <a:pt x="10286091" y="2052948"/>
+                </a:lnTo>
+                <a:lnTo>
+                  <a:pt x="10006086" y="2084826"/>
+                </a:lnTo>
+                <a:lnTo>
+                  <a:pt x="9727310" y="2113902"/>
+                </a:lnTo>
+                <a:lnTo>
+                  <a:pt x="9453445" y="2139124"/>
+                </a:lnTo>
+                <a:lnTo>
+                  <a:pt x="9175897" y="2164346"/>
+                </a:lnTo>
+                <a:lnTo>
+                  <a:pt x="8902033" y="2185365"/>
+                </a:lnTo>
+                <a:lnTo>
+                  <a:pt x="8628169" y="2201829"/>
+                </a:lnTo>
+                <a:lnTo>
+                  <a:pt x="8355533" y="2218995"/>
+                </a:lnTo>
+                <a:lnTo>
+                  <a:pt x="8085353" y="2233357"/>
+                </a:lnTo>
+                <a:lnTo>
+                  <a:pt x="7817629" y="2243516"/>
+                </a:lnTo>
+                <a:lnTo>
+                  <a:pt x="7549905" y="2252274"/>
+                </a:lnTo>
+                <a:lnTo>
+                  <a:pt x="7284638" y="2260681"/>
+                </a:lnTo>
+                <a:lnTo>
+                  <a:pt x="7023055" y="2264535"/>
+                </a:lnTo>
+                <a:lnTo>
+                  <a:pt x="6761472" y="2268738"/>
+                </a:lnTo>
+                <a:lnTo>
+                  <a:pt x="6503573" y="2270840"/>
+                </a:lnTo>
+                <a:lnTo>
+                  <a:pt x="6248130" y="2268738"/>
+                </a:lnTo>
+                <a:lnTo>
+                  <a:pt x="5995144" y="2268738"/>
+                </a:lnTo>
+                <a:lnTo>
+                  <a:pt x="5744613" y="2264535"/>
+                </a:lnTo>
+                <a:lnTo>
+                  <a:pt x="5498995" y="2258229"/>
+                </a:lnTo>
+                <a:lnTo>
+                  <a:pt x="5255834" y="2252274"/>
+                </a:lnTo>
+                <a:lnTo>
+                  <a:pt x="5017584" y="2245618"/>
+                </a:lnTo>
+                <a:lnTo>
+                  <a:pt x="4780562" y="2235459"/>
+                </a:lnTo>
+                <a:lnTo>
+                  <a:pt x="4547227" y="2224599"/>
+                </a:lnTo>
+                <a:lnTo>
+                  <a:pt x="4318800" y="2214791"/>
+                </a:lnTo>
+                <a:lnTo>
+                  <a:pt x="3873004" y="2187116"/>
+                </a:lnTo>
+                <a:lnTo>
+                  <a:pt x="3445628" y="2157691"/>
+                </a:lnTo>
+                <a:lnTo>
+                  <a:pt x="3035446" y="2126863"/>
+                </a:lnTo>
+                <a:lnTo>
+                  <a:pt x="2647370" y="2092884"/>
+                </a:lnTo>
+                <a:lnTo>
+                  <a:pt x="2276487" y="2057502"/>
+                </a:lnTo>
+                <a:lnTo>
+                  <a:pt x="1932621" y="2019319"/>
+                </a:lnTo>
+                <a:lnTo>
+                  <a:pt x="1609634" y="1981836"/>
+                </a:lnTo>
+                <a:lnTo>
+                  <a:pt x="1312435" y="1944353"/>
+                </a:lnTo>
+                <a:lnTo>
+                  <a:pt x="1039799" y="1908972"/>
+                </a:lnTo>
+                <a:lnTo>
+                  <a:pt x="797865" y="1875342"/>
+                </a:lnTo>
+                <a:lnTo>
+                  <a:pt x="579265" y="1843464"/>
+                </a:lnTo>
+                <a:lnTo>
+                  <a:pt x="395052" y="1816841"/>
+                </a:lnTo>
+                <a:lnTo>
+                  <a:pt x="240312" y="1791618"/>
+                </a:lnTo>
+                <a:lnTo>
+                  <a:pt x="27853" y="1755537"/>
+                </a:lnTo>
+                <a:lnTo>
+                  <a:pt x="0" y="1750824"/>
+                </a:lnTo>
+                <a:lnTo>
+                  <a:pt x="0" y="744794"/>
+                </a:lnTo>
+                <a:lnTo>
+                  <a:pt x="0" y="519831"/>
+                </a:lnTo>
+                <a:close/>
+              </a:path>
+            </a:pathLst>
+          </a:custGeom>
+          <a:ln w="44450">
+            <a:gradFill>
+              <a:gsLst>
+                <a:gs pos="0">
+                  <a:schemeClr val="bg2">
+                    <a:alpha val="65000"/>
+                  </a:schemeClr>
+                </a:gs>
+                <a:gs pos="98000">
+                  <a:schemeClr val="bg2">
+                    <a:lumMod val="75000"/>
+                    <a:alpha val="55000"/>
+                  </a:schemeClr>
+                </a:gs>
+              </a:gsLst>
+              <a:lin ang="5400000" scaled="1"/>
+            </a:gradFill>
+          </a:ln>
+          <a:effectLst>
+            <a:outerShdw blurRad="50800" dist="38100" dir="5400000" algn="t" rotWithShape="0">
+              <a:prstClr val="black">
+                <a:alpha val="50000"/>
+              </a:prstClr>
+            </a:outerShdw>
+          </a:effectLst>
+        </p:spPr>
+        <p:style>
+          <a:lnRef idx="2">
+            <a:schemeClr val="accent1">
+              <a:shade val="50000"/>
+            </a:schemeClr>
+          </a:lnRef>
+          <a:fillRef idx="1003">
+            <a:schemeClr val="dk2"/>
+          </a:fillRef>
+          <a:effectRef idx="0">
+            <a:schemeClr val="accent1"/>
+          </a:effectRef>
+          <a:fontRef idx="minor">
+            <a:schemeClr val="lt1"/>
+          </a:fontRef>
+        </p:style>
+        <p:txBody>
+          <a:bodyPr wrap="square" rtlCol="0" anchor="ctr">
+            <a:noAutofit/>
+          </a:bodyPr>
+          <a:lstStyle/>
+          <a:p>
+            <a:pPr algn="ctr"/>
+            <a:endParaRPr lang="en-US" dirty="0"/>
+          </a:p>
+        </p:txBody>
+      </p:sp>
+      <p:sp>
+        <p:nvSpPr>
+          <p:cNvPr id="2" name="Title 1">
+            <a:extLst>
+              <a:ext uri="{FF2B5EF4-FFF2-40B4-BE49-F238E27FC236}">
+                <a16:creationId xmlns:a16="http://schemas.microsoft.com/office/drawing/2014/main" id="{5A70EDA7-1F25-4772-9771-2300E44218B8}"/>
+              </a:ext>
+            </a:extLst>
+          </p:cNvPr>
+          <p:cNvSpPr>
+            <a:spLocks noGrp="1"/>
+          </p:cNvSpPr>
+          <p:nvPr>
+            <p:ph type="title"/>
+          </p:nvPr>
+        </p:nvSpPr>
+        <p:spPr>
+          <a:xfrm>
+            <a:off x="1141413" y="609600"/>
+            <a:ext cx="9905998" cy="1173480"/>
+          </a:xfrm>
+        </p:spPr>
+        <p:txBody>
+          <a:bodyPr>
+            <a:normAutofit/>
+          </a:bodyPr>
+          <a:lstStyle/>
+          <a:p>
+            <a:pPr algn="ctr"/>
+            <a:r>
+              <a:rPr lang="it-IT" dirty="0">
+                <a:effectLst>
+                  <a:glow rad="38100">
+                    <a:prstClr val="black">
+                      <a:lumMod val="65000"/>
+                      <a:lumOff val="35000"/>
+                      <a:alpha val="40000"/>
+                    </a:prstClr>
+                  </a:glow>
+                  <a:outerShdw blurRad="28575" dist="38100" dir="14040000" algn="tl" rotWithShape="0">
+                    <a:srgbClr val="000000">
+                      <a:alpha val="25000"/>
+                    </a:srgbClr>
+                  </a:outerShdw>
+                </a:effectLst>
+              </a:rPr>
+              <a:t>Obiettivi</a:t>
+            </a:r>
+            <a:endParaRPr lang="it-IT" dirty="0"/>
+          </a:p>
+        </p:txBody>
+      </p:sp>
+      <p:sp>
+        <p:nvSpPr>
+          <p:cNvPr id="3" name="Content Placeholder 2">
+            <a:extLst>
+              <a:ext uri="{FF2B5EF4-FFF2-40B4-BE49-F238E27FC236}">
+                <a16:creationId xmlns:a16="http://schemas.microsoft.com/office/drawing/2014/main" id="{EED73C6E-90E9-4CBB-8A7C-11FF43A837A0}"/>
+              </a:ext>
+            </a:extLst>
+          </p:cNvPr>
+          <p:cNvSpPr>
+            <a:spLocks noGrp="1"/>
+          </p:cNvSpPr>
+          <p:nvPr>
+            <p:ph idx="1"/>
+          </p:nvPr>
+        </p:nvSpPr>
+        <p:spPr>
+          <a:xfrm>
+            <a:off x="1141413" y="2666999"/>
+            <a:ext cx="9905998" cy="3124201"/>
+          </a:xfrm>
+        </p:spPr>
+        <p:txBody>
+          <a:bodyPr>
+            <a:normAutofit/>
+          </a:bodyPr>
+          <a:lstStyle/>
+          <a:p>
+            <a:r>
+              <a:rPr lang="it-IT" dirty="0">
+                <a:effectLst>
+                  <a:glow rad="38100">
+                    <a:prstClr val="black">
+                      <a:lumMod val="50000"/>
+                      <a:lumOff val="50000"/>
+                      <a:alpha val="20000"/>
+                    </a:prstClr>
+                  </a:glow>
+                  <a:outerShdw blurRad="44450" dist="12700" dir="13860000" algn="tl" rotWithShape="0">
+                    <a:srgbClr val="000000">
+                      <a:alpha val="20000"/>
+                    </a:srgbClr>
+                  </a:outerShdw>
+                </a:effectLst>
+              </a:rPr>
+              <a:t>Comparazione e ottimizzazione dell'attuale stato dell'arte sulla speaker verification, su più modelli di machine learning e misurarne le performance</a:t>
+            </a:r>
+          </a:p>
+          <a:p>
+            <a:pPr>
+              <a:buClr>
+                <a:srgbClr val="FFFFFF"/>
+              </a:buClr>
+            </a:pPr>
+            <a:r>
+              <a:rPr lang="it-IT" dirty="0">
+                <a:effectLst>
+                  <a:glow rad="38100">
+                    <a:prstClr val="black">
+                      <a:lumMod val="50000"/>
+                      <a:lumOff val="50000"/>
+                      <a:alpha val="20000"/>
+                    </a:prstClr>
+                  </a:glow>
+                  <a:outerShdw blurRad="44450" dist="12700" dir="13860000" algn="tl" rotWithShape="0">
+                    <a:srgbClr val="000000">
+                      <a:alpha val="20000"/>
+                    </a:srgbClr>
+                  </a:outerShdw>
+                </a:effectLst>
+              </a:rPr>
+              <a:t>Valutazione sulla possibilità di un utilizzo di questa tecnologia in ambito probatorio</a:t>
+            </a:r>
+          </a:p>
+        </p:txBody>
+      </p:sp>
+    </p:spTree>
+    <p:extLst>
+      <p:ext uri="{BB962C8B-B14F-4D97-AF65-F5344CB8AC3E}">
+        <p14:creationId xmlns:p14="http://schemas.microsoft.com/office/powerpoint/2010/main" val="3424013670"/>
+      </p:ext>
+    </p:extLst>
+  </p:cSld>
+  <p:clrMapOvr>
+    <a:masterClrMapping/>
+  </p:clrMapOvr>
+</p:sld>
+</file>
+
+<file path=ppt/slides/slide3.xml><?xml version="1.0" encoding="utf-8"?>
+<p:sld xmlns:a="http://schemas.openxmlformats.org/drawingml/2006/main" xmlns:r="http://schemas.openxmlformats.org/officeDocument/2006/relationships" xmlns:p="http://schemas.openxmlformats.org/presentationml/2006/main">
+  <p:cSld>
+    <p:bg>
+      <p:bgPr>
+        <a:blipFill rotWithShape="1">
+          <a:blip r:embed="rId2">
+            <a:duotone>
+              <a:schemeClr val="bg2">
+                <a:shade val="28000"/>
+                <a:satMod val="94000"/>
+                <a:lumMod val="20000"/>
+              </a:schemeClr>
+              <a:schemeClr val="bg2">
+                <a:tint val="94000"/>
+                <a:shade val="84000"/>
+                <a:satMod val="148000"/>
+                <a:lumMod val="114000"/>
+              </a:schemeClr>
+            </a:duotone>
+          </a:blip>
+          <a:stretch/>
+        </a:blipFill>
+        <a:effectLst/>
+      </p:bgPr>
+    </p:bg>
+    <p:spTree>
+      <p:nvGrpSpPr>
+        <p:cNvPr id="1" name=""/>
+        <p:cNvGrpSpPr/>
+        <p:nvPr/>
+      </p:nvGrpSpPr>
+      <p:grpSpPr>
+        <a:xfrm>
+          <a:off x="0" y="0"/>
+          <a:ext cx="0" cy="0"/>
+          <a:chOff x="0" y="0"/>
+          <a:chExt cx="0" cy="0"/>
+        </a:xfrm>
+      </p:grpSpPr>
+      <p:sp>
+        <p:nvSpPr>
+          <p:cNvPr id="8" name="Rectangle 7">
+            <a:extLst>
+              <a:ext uri="{FF2B5EF4-FFF2-40B4-BE49-F238E27FC236}">
+                <a16:creationId xmlns:a16="http://schemas.microsoft.com/office/drawing/2014/main" id="{5BBD3ED2-B0E6-45A2-ABD5-ECF31BC37C2E}"/>
+              </a:ext>
+              <a:ext uri="{C183D7F6-B498-43B3-948B-1728B52AA6E4}">
+                <adec:decorative xmlns:adec="http://schemas.microsoft.com/office/drawing/2017/decorative" val="1"/>
+              </a:ext>
+            </a:extLst>
+          </p:cNvPr>
+          <p:cNvSpPr>
+            <a:spLocks noGrp="1" noRot="1" noChangeAspect="1" noMove="1" noResize="1" noEditPoints="1" noAdjustHandles="1" noChangeArrowheads="1" noChangeShapeType="1" noTextEdit="1"/>
+          </p:cNvSpPr>
+          <p:nvPr>
+            <p:extLst>
+              <p:ext uri="{386F3935-93C4-4BCD-93E2-E3B085C9AB24}">
+                <p16:designElem xmlns:p16="http://schemas.microsoft.com/office/powerpoint/2015/main" val="1"/>
+              </p:ext>
+            </p:extLst>
+          </p:nvPr>
+        </p:nvSpPr>
+        <p:spPr>
+          <a:xfrm>
+            <a:off x="0" y="0"/>
+            <a:ext cx="12192000" cy="6858000"/>
+          </a:xfrm>
+          <a:prstGeom prst="rect">
+            <a:avLst/>
+          </a:prstGeom>
+          <a:solidFill>
+            <a:schemeClr val="bg2"/>
+          </a:solidFill>
+          <a:ln>
+            <a:noFill/>
+          </a:ln>
+        </p:spPr>
+        <p:style>
+          <a:lnRef idx="2">
+            <a:schemeClr val="accent1">
+              <a:shade val="50000"/>
+            </a:schemeClr>
+          </a:lnRef>
+          <a:fillRef idx="1">
+            <a:schemeClr val="accent1"/>
+          </a:fillRef>
+          <a:effectRef idx="0">
+            <a:schemeClr val="accent1"/>
+          </a:effectRef>
+          <a:fontRef idx="minor">
+            <a:schemeClr val="lt1"/>
+          </a:fontRef>
+        </p:style>
+        <p:txBody>
+          <a:bodyPr rtlCol="0" anchor="ctr"/>
+          <a:lstStyle/>
+          <a:p>
+            <a:pPr algn="ctr"/>
+            <a:endParaRPr lang="en-US" dirty="0"/>
+          </a:p>
+        </p:txBody>
+      </p:sp>
+      <p:sp>
+        <p:nvSpPr>
+          <p:cNvPr id="10" name="Rectangle 9">
+            <a:extLst>
+              <a:ext uri="{FF2B5EF4-FFF2-40B4-BE49-F238E27FC236}">
+                <a16:creationId xmlns:a16="http://schemas.microsoft.com/office/drawing/2014/main" id="{F2D2D1E8-4ABF-4B6B-B39D-40B080B61E49}"/>
+              </a:ext>
+              <a:ext uri="{C183D7F6-B498-43B3-948B-1728B52AA6E4}">
+                <adec:decorative xmlns:adec="http://schemas.microsoft.com/office/drawing/2017/decorative" val="1"/>
+              </a:ext>
+            </a:extLst>
+          </p:cNvPr>
+          <p:cNvSpPr>
+            <a:spLocks noGrp="1" noRot="1" noChangeAspect="1" noMove="1" noResize="1" noEditPoints="1" noAdjustHandles="1" noChangeArrowheads="1" noChangeShapeType="1" noTextEdit="1"/>
+          </p:cNvSpPr>
+          <p:nvPr>
+            <p:extLst>
+              <p:ext uri="{386F3935-93C4-4BCD-93E2-E3B085C9AB24}">
+                <p16:designElem xmlns:p16="http://schemas.microsoft.com/office/powerpoint/2015/main" val="1"/>
+              </p:ext>
+            </p:extLst>
+          </p:nvPr>
+        </p:nvSpPr>
+        <p:spPr>
+          <a:xfrm>
+            <a:off x="763160" y="0"/>
+            <a:ext cx="9369421" cy="6857999"/>
+          </a:xfrm>
+          <a:prstGeom prst="rect">
+            <a:avLst/>
+          </a:prstGeom>
+          <a:gradFill flip="none" rotWithShape="1">
+            <a:gsLst>
+              <a:gs pos="10000">
+                <a:schemeClr val="bg2">
+                  <a:lumMod val="60000"/>
+                  <a:lumOff val="40000"/>
+                  <a:alpha val="40000"/>
+                </a:schemeClr>
+              </a:gs>
+              <a:gs pos="70000">
+                <a:schemeClr val="bg2">
+                  <a:alpha val="0"/>
+                </a:schemeClr>
+              </a:gs>
+              <a:gs pos="0">
+                <a:schemeClr val="bg2">
+                  <a:lumMod val="40000"/>
+                  <a:lumOff val="60000"/>
+                  <a:alpha val="50000"/>
+                </a:schemeClr>
+              </a:gs>
+            </a:gsLst>
+            <a:path path="circle">
+              <a:fillToRect l="50000" t="50000" r="50000" b="50000"/>
+            </a:path>
+            <a:tileRect/>
+          </a:gradFill>
+          <a:ln>
+            <a:noFill/>
+          </a:ln>
+        </p:spPr>
+        <p:style>
+          <a:lnRef idx="2">
+            <a:schemeClr val="accent1">
+              <a:shade val="50000"/>
+            </a:schemeClr>
+          </a:lnRef>
+          <a:fillRef idx="1">
+            <a:schemeClr val="accent1"/>
+          </a:fillRef>
+          <a:effectRef idx="0">
+            <a:schemeClr val="accent1"/>
+          </a:effectRef>
+          <a:fontRef idx="minor">
+            <a:schemeClr val="lt1"/>
+          </a:fontRef>
+        </p:style>
+        <p:txBody>
+          <a:bodyPr rtlCol="0" anchor="ctr"/>
+          <a:lstStyle/>
+          <a:p>
+            <a:pPr algn="ctr"/>
+            <a:endParaRPr lang="en-US" dirty="0"/>
+          </a:p>
+        </p:txBody>
+      </p:sp>
+      <p:sp useBgFill="1">
+        <p:nvSpPr>
+          <p:cNvPr id="12" name="Freeform: Shape 11">
+            <a:extLst>
+              <a:ext uri="{FF2B5EF4-FFF2-40B4-BE49-F238E27FC236}">
+                <a16:creationId xmlns:a16="http://schemas.microsoft.com/office/drawing/2014/main" id="{BC7AB4B5-66A5-48D1-BD88-C60A16ED971B}"/>
+              </a:ext>
+              <a:ext uri="{C183D7F6-B498-43B3-948B-1728B52AA6E4}">
+                <adec:decorative xmlns:adec="http://schemas.microsoft.com/office/drawing/2017/decorative" val="1"/>
+              </a:ext>
+            </a:extLst>
+          </p:cNvPr>
+          <p:cNvSpPr>
+            <a:spLocks noGrp="1" noRot="1" noChangeAspect="1" noMove="1" noResize="1" noEditPoints="1" noAdjustHandles="1" noChangeArrowheads="1" noChangeShapeType="1" noTextEdit="1"/>
+          </p:cNvSpPr>
+          <p:nvPr>
+            <p:extLst>
+              <p:ext uri="{386F3935-93C4-4BCD-93E2-E3B085C9AB24}">
+                <p16:designElem xmlns:p16="http://schemas.microsoft.com/office/powerpoint/2015/main" val="1"/>
+              </p:ext>
+            </p:extLst>
+          </p:nvPr>
+        </p:nvSpPr>
+        <p:spPr>
+          <a:xfrm>
+            <a:off x="0" y="-2"/>
+            <a:ext cx="6088489" cy="6858002"/>
+          </a:xfrm>
+          <a:custGeom>
+            <a:avLst/>
+            <a:gdLst>
+              <a:gd name="connsiteX0" fmla="*/ 0 w 6088489"/>
+              <a:gd name="connsiteY0" fmla="*/ 0 h 6858002"/>
+              <a:gd name="connsiteX1" fmla="*/ 3563332 w 6088489"/>
+              <a:gd name="connsiteY1" fmla="*/ 0 h 6858002"/>
+              <a:gd name="connsiteX2" fmla="*/ 3563332 w 6088489"/>
+              <a:gd name="connsiteY2" fmla="*/ 3 h 6858002"/>
+              <a:gd name="connsiteX3" fmla="*/ 5842099 w 6088489"/>
+              <a:gd name="connsiteY3" fmla="*/ 3 h 6858002"/>
+              <a:gd name="connsiteX4" fmla="*/ 5842099 w 6088489"/>
+              <a:gd name="connsiteY4" fmla="*/ 4 h 6858002"/>
+              <a:gd name="connsiteX5" fmla="*/ 5835346 w 6088489"/>
+              <a:gd name="connsiteY5" fmla="*/ 4 h 6858002"/>
+              <a:gd name="connsiteX6" fmla="*/ 5841229 w 6088489"/>
+              <a:gd name="connsiteY6" fmla="*/ 40466 h 6858002"/>
+              <a:gd name="connsiteX7" fmla="*/ 5858543 w 6088489"/>
+              <a:gd name="connsiteY7" fmla="*/ 159110 h 6858002"/>
+              <a:gd name="connsiteX8" fmla="*/ 5870645 w 6088489"/>
+              <a:gd name="connsiteY8" fmla="*/ 245521 h 6858002"/>
+              <a:gd name="connsiteX9" fmla="*/ 5883420 w 6088489"/>
+              <a:gd name="connsiteY9" fmla="*/ 348391 h 6858002"/>
+              <a:gd name="connsiteX10" fmla="*/ 5898716 w 6088489"/>
+              <a:gd name="connsiteY10" fmla="*/ 470463 h 6858002"/>
+              <a:gd name="connsiteX11" fmla="*/ 5914853 w 6088489"/>
+              <a:gd name="connsiteY11" fmla="*/ 605566 h 6858002"/>
+              <a:gd name="connsiteX12" fmla="*/ 5931830 w 6088489"/>
+              <a:gd name="connsiteY12" fmla="*/ 757813 h 6858002"/>
+              <a:gd name="connsiteX13" fmla="*/ 5949815 w 6088489"/>
+              <a:gd name="connsiteY13" fmla="*/ 923777 h 6858002"/>
+              <a:gd name="connsiteX14" fmla="*/ 5967801 w 6088489"/>
+              <a:gd name="connsiteY14" fmla="*/ 1104142 h 6858002"/>
+              <a:gd name="connsiteX15" fmla="*/ 5986122 w 6088489"/>
+              <a:gd name="connsiteY15" fmla="*/ 1296166 h 6858002"/>
+              <a:gd name="connsiteX16" fmla="*/ 6003099 w 6088489"/>
+              <a:gd name="connsiteY16" fmla="*/ 1503278 h 6858002"/>
+              <a:gd name="connsiteX17" fmla="*/ 6019404 w 6088489"/>
+              <a:gd name="connsiteY17" fmla="*/ 1719991 h 6858002"/>
+              <a:gd name="connsiteX18" fmla="*/ 6034196 w 6088489"/>
+              <a:gd name="connsiteY18" fmla="*/ 1949048 h 6858002"/>
+              <a:gd name="connsiteX19" fmla="*/ 6048315 w 6088489"/>
+              <a:gd name="connsiteY19" fmla="*/ 2187706 h 6858002"/>
+              <a:gd name="connsiteX20" fmla="*/ 6061595 w 6088489"/>
+              <a:gd name="connsiteY20" fmla="*/ 2436652 h 6858002"/>
+              <a:gd name="connsiteX21" fmla="*/ 6066301 w 6088489"/>
+              <a:gd name="connsiteY21" fmla="*/ 2564211 h 6858002"/>
+              <a:gd name="connsiteX22" fmla="*/ 6071512 w 6088489"/>
+              <a:gd name="connsiteY22" fmla="*/ 2694512 h 6858002"/>
+              <a:gd name="connsiteX23" fmla="*/ 6076386 w 6088489"/>
+              <a:gd name="connsiteY23" fmla="*/ 2826871 h 6858002"/>
+              <a:gd name="connsiteX24" fmla="*/ 6079580 w 6088489"/>
+              <a:gd name="connsiteY24" fmla="*/ 2959917 h 6858002"/>
+              <a:gd name="connsiteX25" fmla="*/ 6082438 w 6088489"/>
+              <a:gd name="connsiteY25" fmla="*/ 3095705 h 6858002"/>
+              <a:gd name="connsiteX26" fmla="*/ 6085463 w 6088489"/>
+              <a:gd name="connsiteY26" fmla="*/ 3232865 h 6858002"/>
+              <a:gd name="connsiteX27" fmla="*/ 6087480 w 6088489"/>
+              <a:gd name="connsiteY27" fmla="*/ 3372768 h 6858002"/>
+              <a:gd name="connsiteX28" fmla="*/ 6087480 w 6088489"/>
+              <a:gd name="connsiteY28" fmla="*/ 3514043 h 6858002"/>
+              <a:gd name="connsiteX29" fmla="*/ 6088489 w 6088489"/>
+              <a:gd name="connsiteY29" fmla="*/ 3656689 h 6858002"/>
+              <a:gd name="connsiteX30" fmla="*/ 6087480 w 6088489"/>
+              <a:gd name="connsiteY30" fmla="*/ 3800707 h 6858002"/>
+              <a:gd name="connsiteX31" fmla="*/ 6085463 w 6088489"/>
+              <a:gd name="connsiteY31" fmla="*/ 3946783 h 6858002"/>
+              <a:gd name="connsiteX32" fmla="*/ 6083614 w 6088489"/>
+              <a:gd name="connsiteY32" fmla="*/ 4092858 h 6858002"/>
+              <a:gd name="connsiteX33" fmla="*/ 6079580 w 6088489"/>
+              <a:gd name="connsiteY33" fmla="*/ 4240991 h 6858002"/>
+              <a:gd name="connsiteX34" fmla="*/ 6075378 w 6088489"/>
+              <a:gd name="connsiteY34" fmla="*/ 4390495 h 6858002"/>
+              <a:gd name="connsiteX35" fmla="*/ 6070503 w 6088489"/>
+              <a:gd name="connsiteY35" fmla="*/ 4540000 h 6858002"/>
+              <a:gd name="connsiteX36" fmla="*/ 6063612 w 6088489"/>
+              <a:gd name="connsiteY36" fmla="*/ 4690876 h 6858002"/>
+              <a:gd name="connsiteX37" fmla="*/ 6055375 w 6088489"/>
+              <a:gd name="connsiteY37" fmla="*/ 4843123 h 6858002"/>
+              <a:gd name="connsiteX38" fmla="*/ 6047475 w 6088489"/>
+              <a:gd name="connsiteY38" fmla="*/ 4996057 h 6858002"/>
+              <a:gd name="connsiteX39" fmla="*/ 6037390 w 6088489"/>
+              <a:gd name="connsiteY39" fmla="*/ 5148990 h 6858002"/>
+              <a:gd name="connsiteX40" fmla="*/ 6025287 w 6088489"/>
+              <a:gd name="connsiteY40" fmla="*/ 5303981 h 6858002"/>
+              <a:gd name="connsiteX41" fmla="*/ 6013185 w 6088489"/>
+              <a:gd name="connsiteY41" fmla="*/ 5456914 h 6858002"/>
+              <a:gd name="connsiteX42" fmla="*/ 5999233 w 6088489"/>
+              <a:gd name="connsiteY42" fmla="*/ 5612591 h 6858002"/>
+              <a:gd name="connsiteX43" fmla="*/ 5983937 w 6088489"/>
+              <a:gd name="connsiteY43" fmla="*/ 5768953 h 6858002"/>
+              <a:gd name="connsiteX44" fmla="*/ 5967801 w 6088489"/>
+              <a:gd name="connsiteY44" fmla="*/ 5923258 h 6858002"/>
+              <a:gd name="connsiteX45" fmla="*/ 5948975 w 6088489"/>
+              <a:gd name="connsiteY45" fmla="*/ 6079621 h 6858002"/>
+              <a:gd name="connsiteX46" fmla="*/ 5928804 w 6088489"/>
+              <a:gd name="connsiteY46" fmla="*/ 6235297 h 6858002"/>
+              <a:gd name="connsiteX47" fmla="*/ 5908801 w 6088489"/>
+              <a:gd name="connsiteY47" fmla="*/ 6391660 h 6858002"/>
+              <a:gd name="connsiteX48" fmla="*/ 5885437 w 6088489"/>
+              <a:gd name="connsiteY48" fmla="*/ 6547336 h 6858002"/>
+              <a:gd name="connsiteX49" fmla="*/ 5861568 w 6088489"/>
+              <a:gd name="connsiteY49" fmla="*/ 6702327 h 6858002"/>
+              <a:gd name="connsiteX50" fmla="*/ 5836524 w 6088489"/>
+              <a:gd name="connsiteY50" fmla="*/ 6858002 h 6858002"/>
+              <a:gd name="connsiteX51" fmla="*/ 3563332 w 6088489"/>
+              <a:gd name="connsiteY51" fmla="*/ 6858002 h 6858002"/>
+              <a:gd name="connsiteX52" fmla="*/ 1223490 w 6088489"/>
+              <a:gd name="connsiteY52" fmla="*/ 6858002 h 6858002"/>
+              <a:gd name="connsiteX53" fmla="*/ 0 w 6088489"/>
+              <a:gd name="connsiteY53" fmla="*/ 6858002 h 6858002"/>
+            </a:gdLst>
+            <a:ahLst/>
+            <a:cxnLst>
+              <a:cxn ang="0">
+                <a:pos x="connsiteX0" y="connsiteY0"/>
+              </a:cxn>
+              <a:cxn ang="0">
+                <a:pos x="connsiteX1" y="connsiteY1"/>
+              </a:cxn>
+              <a:cxn ang="0">
+                <a:pos x="connsiteX2" y="connsiteY2"/>
+              </a:cxn>
+              <a:cxn ang="0">
+                <a:pos x="connsiteX3" y="connsiteY3"/>
+              </a:cxn>
+              <a:cxn ang="0">
+                <a:pos x="connsiteX4" y="connsiteY4"/>
+              </a:cxn>
+              <a:cxn ang="0">
+                <a:pos x="connsiteX5" y="connsiteY5"/>
+              </a:cxn>
+              <a:cxn ang="0">
+                <a:pos x="connsiteX6" y="connsiteY6"/>
+              </a:cxn>
+              <a:cxn ang="0">
+                <a:pos x="connsiteX7" y="connsiteY7"/>
+              </a:cxn>
+              <a:cxn ang="0">
+                <a:pos x="connsiteX8" y="connsiteY8"/>
+              </a:cxn>
+              <a:cxn ang="0">
+                <a:pos x="connsiteX9" y="connsiteY9"/>
+              </a:cxn>
+              <a:cxn ang="0">
+                <a:pos x="connsiteX10" y="connsiteY10"/>
+              </a:cxn>
+              <a:cxn ang="0">
+                <a:pos x="connsiteX11" y="connsiteY11"/>
+              </a:cxn>
+              <a:cxn ang="0">
+                <a:pos x="connsiteX12" y="connsiteY12"/>
+              </a:cxn>
+              <a:cxn ang="0">
+                <a:pos x="connsiteX13" y="connsiteY13"/>
+              </a:cxn>
+              <a:cxn ang="0">
+                <a:pos x="connsiteX14" y="connsiteY14"/>
+              </a:cxn>
+              <a:cxn ang="0">
+                <a:pos x="connsiteX15" y="connsiteY15"/>
+              </a:cxn>
+              <a:cxn ang="0">
+                <a:pos x="connsiteX16" y="connsiteY16"/>
+              </a:cxn>
+              <a:cxn ang="0">
+                <a:pos x="connsiteX17" y="connsiteY17"/>
+              </a:cxn>
+              <a:cxn ang="0">
+                <a:pos x="connsiteX18" y="connsiteY18"/>
+              </a:cxn>
+              <a:cxn ang="0">
+                <a:pos x="connsiteX19" y="connsiteY19"/>
+              </a:cxn>
+              <a:cxn ang="0">
+                <a:pos x="connsiteX20" y="connsiteY20"/>
+              </a:cxn>
+              <a:cxn ang="0">
+                <a:pos x="connsiteX21" y="connsiteY21"/>
+              </a:cxn>
+              <a:cxn ang="0">
+                <a:pos x="connsiteX22" y="connsiteY22"/>
+              </a:cxn>
+              <a:cxn ang="0">
+                <a:pos x="connsiteX23" y="connsiteY23"/>
+              </a:cxn>
+              <a:cxn ang="0">
+                <a:pos x="connsiteX24" y="connsiteY24"/>
+              </a:cxn>
+              <a:cxn ang="0">
+                <a:pos x="connsiteX25" y="connsiteY25"/>
+              </a:cxn>
+              <a:cxn ang="0">
+                <a:pos x="connsiteX26" y="connsiteY26"/>
+              </a:cxn>
+              <a:cxn ang="0">
+                <a:pos x="connsiteX27" y="connsiteY27"/>
+              </a:cxn>
+              <a:cxn ang="0">
+                <a:pos x="connsiteX28" y="connsiteY28"/>
+              </a:cxn>
+              <a:cxn ang="0">
+                <a:pos x="connsiteX29" y="connsiteY29"/>
+              </a:cxn>
+              <a:cxn ang="0">
+                <a:pos x="connsiteX30" y="connsiteY30"/>
+              </a:cxn>
+              <a:cxn ang="0">
+                <a:pos x="connsiteX31" y="connsiteY31"/>
+              </a:cxn>
+              <a:cxn ang="0">
+                <a:pos x="connsiteX32" y="connsiteY32"/>
+              </a:cxn>
+              <a:cxn ang="0">
+                <a:pos x="connsiteX33" y="connsiteY33"/>
+              </a:cxn>
+              <a:cxn ang="0">
+                <a:pos x="connsiteX34" y="connsiteY34"/>
+              </a:cxn>
+              <a:cxn ang="0">
+                <a:pos x="connsiteX35" y="connsiteY35"/>
+              </a:cxn>
+              <a:cxn ang="0">
+                <a:pos x="connsiteX36" y="connsiteY36"/>
+              </a:cxn>
+              <a:cxn ang="0">
+                <a:pos x="connsiteX37" y="connsiteY37"/>
+              </a:cxn>
+              <a:cxn ang="0">
+                <a:pos x="connsiteX38" y="connsiteY38"/>
+              </a:cxn>
+              <a:cxn ang="0">
+                <a:pos x="connsiteX39" y="connsiteY39"/>
+              </a:cxn>
+              <a:cxn ang="0">
+                <a:pos x="connsiteX40" y="connsiteY40"/>
+              </a:cxn>
+              <a:cxn ang="0">
+                <a:pos x="connsiteX41" y="connsiteY41"/>
+              </a:cxn>
+              <a:cxn ang="0">
+                <a:pos x="connsiteX42" y="connsiteY42"/>
+              </a:cxn>
+              <a:cxn ang="0">
+                <a:pos x="connsiteX43" y="connsiteY43"/>
+              </a:cxn>
+              <a:cxn ang="0">
+                <a:pos x="connsiteX44" y="connsiteY44"/>
+              </a:cxn>
+              <a:cxn ang="0">
+                <a:pos x="connsiteX45" y="connsiteY45"/>
+              </a:cxn>
+              <a:cxn ang="0">
+                <a:pos x="connsiteX46" y="connsiteY46"/>
+              </a:cxn>
+              <a:cxn ang="0">
+                <a:pos x="connsiteX47" y="connsiteY47"/>
+              </a:cxn>
+              <a:cxn ang="0">
+                <a:pos x="connsiteX48" y="connsiteY48"/>
+              </a:cxn>
+              <a:cxn ang="0">
+                <a:pos x="connsiteX49" y="connsiteY49"/>
+              </a:cxn>
+              <a:cxn ang="0">
+                <a:pos x="connsiteX50" y="connsiteY50"/>
+              </a:cxn>
+              <a:cxn ang="0">
+                <a:pos x="connsiteX51" y="connsiteY51"/>
+              </a:cxn>
+              <a:cxn ang="0">
+                <a:pos x="connsiteX52" y="connsiteY52"/>
+              </a:cxn>
+              <a:cxn ang="0">
+                <a:pos x="connsiteX53" y="connsiteY53"/>
+              </a:cxn>
+            </a:cxnLst>
+            <a:rect l="l" t="t" r="r" b="b"/>
+            <a:pathLst>
+              <a:path w="6088489" h="6858002">
+                <a:moveTo>
+                  <a:pt x="0" y="0"/>
+                </a:moveTo>
+                <a:lnTo>
+                  <a:pt x="3563332" y="0"/>
+                </a:lnTo>
+                <a:lnTo>
+                  <a:pt x="3563332" y="3"/>
+                </a:lnTo>
+                <a:lnTo>
+                  <a:pt x="5842099" y="3"/>
+                </a:lnTo>
+                <a:lnTo>
+                  <a:pt x="5842099" y="4"/>
+                </a:lnTo>
+                <a:lnTo>
+                  <a:pt x="5835346" y="4"/>
+                </a:lnTo>
+                <a:lnTo>
+                  <a:pt x="5841229" y="40466"/>
+                </a:lnTo>
+                <a:lnTo>
+                  <a:pt x="5858543" y="159110"/>
+                </a:lnTo>
+                <a:lnTo>
+                  <a:pt x="5870645" y="245521"/>
+                </a:lnTo>
+                <a:lnTo>
+                  <a:pt x="5883420" y="348391"/>
+                </a:lnTo>
+                <a:lnTo>
+                  <a:pt x="5898716" y="470463"/>
+                </a:lnTo>
+                <a:lnTo>
+                  <a:pt x="5914853" y="605566"/>
+                </a:lnTo>
+                <a:lnTo>
+                  <a:pt x="5931830" y="757813"/>
+                </a:lnTo>
+                <a:lnTo>
+                  <a:pt x="5949815" y="923777"/>
+                </a:lnTo>
+                <a:lnTo>
+                  <a:pt x="5967801" y="1104142"/>
+                </a:lnTo>
+                <a:lnTo>
+                  <a:pt x="5986122" y="1296166"/>
+                </a:lnTo>
+                <a:lnTo>
+                  <a:pt x="6003099" y="1503278"/>
+                </a:lnTo>
+                <a:lnTo>
+                  <a:pt x="6019404" y="1719991"/>
+                </a:lnTo>
+                <a:lnTo>
+                  <a:pt x="6034196" y="1949048"/>
+                </a:lnTo>
+                <a:lnTo>
+                  <a:pt x="6048315" y="2187706"/>
+                </a:lnTo>
+                <a:lnTo>
+                  <a:pt x="6061595" y="2436652"/>
+                </a:lnTo>
+                <a:lnTo>
+                  <a:pt x="6066301" y="2564211"/>
+                </a:lnTo>
+                <a:lnTo>
+                  <a:pt x="6071512" y="2694512"/>
+                </a:lnTo>
+                <a:lnTo>
+                  <a:pt x="6076386" y="2826871"/>
+                </a:lnTo>
+                <a:lnTo>
+                  <a:pt x="6079580" y="2959917"/>
+                </a:lnTo>
+                <a:lnTo>
+                  <a:pt x="6082438" y="3095705"/>
+                </a:lnTo>
+                <a:lnTo>
+                  <a:pt x="6085463" y="3232865"/>
+                </a:lnTo>
+                <a:lnTo>
+                  <a:pt x="6087480" y="3372768"/>
+                </a:lnTo>
+                <a:lnTo>
+                  <a:pt x="6087480" y="3514043"/>
+                </a:lnTo>
+                <a:lnTo>
+                  <a:pt x="6088489" y="3656689"/>
+                </a:lnTo>
+                <a:lnTo>
+                  <a:pt x="6087480" y="3800707"/>
+                </a:lnTo>
+                <a:lnTo>
+                  <a:pt x="6085463" y="3946783"/>
+                </a:lnTo>
+                <a:lnTo>
+                  <a:pt x="6083614" y="4092858"/>
+                </a:lnTo>
+                <a:lnTo>
+                  <a:pt x="6079580" y="4240991"/>
+                </a:lnTo>
+                <a:lnTo>
+                  <a:pt x="6075378" y="4390495"/>
+                </a:lnTo>
+                <a:lnTo>
+                  <a:pt x="6070503" y="4540000"/>
+                </a:lnTo>
+                <a:lnTo>
+                  <a:pt x="6063612" y="4690876"/>
+                </a:lnTo>
+                <a:lnTo>
+                  <a:pt x="6055375" y="4843123"/>
+                </a:lnTo>
+                <a:lnTo>
+                  <a:pt x="6047475" y="4996057"/>
+                </a:lnTo>
+                <a:lnTo>
+                  <a:pt x="6037390" y="5148990"/>
+                </a:lnTo>
+                <a:lnTo>
+                  <a:pt x="6025287" y="5303981"/>
+                </a:lnTo>
+                <a:lnTo>
+                  <a:pt x="6013185" y="5456914"/>
+                </a:lnTo>
+                <a:lnTo>
+                  <a:pt x="5999233" y="5612591"/>
+                </a:lnTo>
+                <a:lnTo>
+                  <a:pt x="5983937" y="5768953"/>
+                </a:lnTo>
+                <a:lnTo>
+                  <a:pt x="5967801" y="5923258"/>
+                </a:lnTo>
+                <a:lnTo>
+                  <a:pt x="5948975" y="6079621"/>
+                </a:lnTo>
+                <a:lnTo>
+                  <a:pt x="5928804" y="6235297"/>
+                </a:lnTo>
+                <a:lnTo>
+                  <a:pt x="5908801" y="6391660"/>
+                </a:lnTo>
+                <a:lnTo>
+                  <a:pt x="5885437" y="6547336"/>
+                </a:lnTo>
+                <a:lnTo>
+                  <a:pt x="5861568" y="6702327"/>
+                </a:lnTo>
+                <a:lnTo>
+                  <a:pt x="5836524" y="6858002"/>
+                </a:lnTo>
+                <a:lnTo>
+                  <a:pt x="3563332" y="6858002"/>
+                </a:lnTo>
+                <a:lnTo>
+                  <a:pt x="1223490" y="6858002"/>
+                </a:lnTo>
+                <a:lnTo>
+                  <a:pt x="0" y="6858002"/>
+                </a:lnTo>
+                <a:close/>
+              </a:path>
+            </a:pathLst>
+          </a:custGeom>
+          <a:ln w="44450">
+            <a:gradFill>
+              <a:gsLst>
+                <a:gs pos="5000">
+                  <a:schemeClr val="bg2">
+                    <a:alpha val="65000"/>
+                  </a:schemeClr>
+                </a:gs>
+                <a:gs pos="98000">
+                  <a:schemeClr val="bg2">
+                    <a:lumMod val="75000"/>
+                    <a:alpha val="55000"/>
+                  </a:schemeClr>
+                </a:gs>
+              </a:gsLst>
+              <a:lin ang="5400000" scaled="1"/>
+            </a:gradFill>
+          </a:ln>
+          <a:effectLst>
+            <a:outerShdw blurRad="50800" dist="25400" algn="l" rotWithShape="0">
+              <a:prstClr val="black">
+                <a:alpha val="60000"/>
+              </a:prstClr>
+            </a:outerShdw>
+          </a:effectLst>
+        </p:spPr>
+        <p:style>
+          <a:lnRef idx="2">
+            <a:schemeClr val="accent1">
+              <a:shade val="50000"/>
+            </a:schemeClr>
+          </a:lnRef>
+          <a:fillRef idx="1">
+            <a:schemeClr val="accent1"/>
+          </a:fillRef>
+          <a:effectRef idx="0">
+            <a:schemeClr val="accent1"/>
+          </a:effectRef>
+          <a:fontRef idx="minor">
+            <a:schemeClr val="lt1"/>
+          </a:fontRef>
+        </p:style>
+        <p:txBody>
+          <a:bodyPr rtlCol="0" anchor="ctr"/>
+          <a:lstStyle/>
+          <a:p>
+            <a:pPr algn="ctr"/>
             <a:endParaRPr lang="en-US" dirty="0"/>
           </a:p>
         </p:txBody>
@@ -15285,7 +16748,7 @@
         </p:blipFill>
         <p:spPr>
           <a:xfrm>
-            <a:off x="7848617" y="911502"/>
+            <a:off x="7455212" y="464432"/>
             <a:ext cx="3113988" cy="2964568"/>
           </a:xfrm>
           <a:prstGeom prst="rect">
@@ -15357,7 +16820,7 @@
         </p:blipFill>
         <p:spPr>
           <a:xfrm>
-            <a:off x="6291623" y="3806876"/>
+            <a:off x="6695442" y="3788667"/>
             <a:ext cx="3113988" cy="2603532"/>
           </a:xfrm>
           <a:prstGeom prst="rect">
@@ -16985,12 +18448,6 @@
 </file>
 
 <file path=customXml/item1.xml><?xml version="1.0" encoding="utf-8"?>
-<p:properties xmlns:p="http://schemas.microsoft.com/office/2006/metadata/properties" xmlns:xsi="http://www.w3.org/2001/XMLSchema-instance" xmlns:pc="http://schemas.microsoft.com/office/infopath/2007/PartnerControls">
-  <documentManagement/>
-</p:properties>
-</file>
-
-<file path=customXml/item2.xml><?xml version="1.0" encoding="utf-8"?>
 <ct:contentTypeSchema xmlns:ct="http://schemas.microsoft.com/office/2006/metadata/contentType" xmlns:ma="http://schemas.microsoft.com/office/2006/metadata/properties/metaAttributes" ct:_="" ma:_="" ma:contentTypeName="Document" ma:contentTypeID="0x010100A3D4D41B7235C04E835EF2B50CA1FBAD" ma:contentTypeVersion="4" ma:contentTypeDescription="Create a new document." ma:contentTypeScope="" ma:versionID="243517b39ca04d84bed70313c371401f">
   <xsd:schema xmlns:xsd="http://www.w3.org/2001/XMLSchema" xmlns:xs="http://www.w3.org/2001/XMLSchema" xmlns:p="http://schemas.microsoft.com/office/2006/metadata/properties" xmlns:ns3="dbda0fc6-3c13-48b8-b10e-930e7a47ceb9" targetNamespace="http://schemas.microsoft.com/office/2006/metadata/properties" ma:root="true" ma:fieldsID="6d20852113e358c23b4e3cd17de032bf" ns3:_="">
     <xsd:import namespace="dbda0fc6-3c13-48b8-b10e-930e7a47ceb9"/>
@@ -17136,6 +18593,12 @@
 </ct:contentTypeSchema>
 </file>
 
+<file path=customXml/item2.xml><?xml version="1.0" encoding="utf-8"?>
+<p:properties xmlns:p="http://schemas.microsoft.com/office/2006/metadata/properties" xmlns:xsi="http://www.w3.org/2001/XMLSchema-instance" xmlns:pc="http://schemas.microsoft.com/office/infopath/2007/PartnerControls">
+  <documentManagement/>
+</p:properties>
+</file>
+
 <file path=customXml/item3.xml><?xml version="1.0" encoding="utf-8"?>
 <?mso-contentType ?>
 <FormTemplates xmlns="http://schemas.microsoft.com/sharepoint/v3/contenttype/forms">
@@ -17146,22 +18609,6 @@
 </file>
 
 <file path=customXml/itemProps1.xml><?xml version="1.0" encoding="utf-8"?>
-<ds:datastoreItem xmlns:ds="http://schemas.openxmlformats.org/officeDocument/2006/customXml" ds:itemID="{84D51D2E-896C-4BD2-8DCE-D63C536AE556}">
-  <ds:schemaRefs>
-    <ds:schemaRef ds:uri="http://schemas.openxmlformats.org/package/2006/metadata/core-properties"/>
-    <ds:schemaRef ds:uri="http://schemas.microsoft.com/office/infopath/2007/PartnerControls"/>
-    <ds:schemaRef ds:uri="http://purl.org/dc/elements/1.1/"/>
-    <ds:schemaRef ds:uri="http://purl.org/dc/dcmitype/"/>
-    <ds:schemaRef ds:uri="http://schemas.microsoft.com/office/2006/documentManagement/types"/>
-    <ds:schemaRef ds:uri="http://www.w3.org/XML/1998/namespace"/>
-    <ds:schemaRef ds:uri="dbda0fc6-3c13-48b8-b10e-930e7a47ceb9"/>
-    <ds:schemaRef ds:uri="http://schemas.microsoft.com/office/2006/metadata/properties"/>
-    <ds:schemaRef ds:uri="http://purl.org/dc/terms/"/>
-  </ds:schemaRefs>
-</ds:datastoreItem>
-</file>
-
-<file path=customXml/itemProps2.xml><?xml version="1.0" encoding="utf-8"?>
 <ds:datastoreItem xmlns:ds="http://schemas.openxmlformats.org/officeDocument/2006/customXml" ds:itemID="{89538E6B-1F74-4306-878A-84A6AEB8C109}">
   <ds:schemaRefs>
     <ds:schemaRef ds:uri="http://schemas.microsoft.com/office/2006/metadata/contentType"/>
@@ -17179,6 +18626,22 @@
 </ds:datastoreItem>
 </file>
 
+<file path=customXml/itemProps2.xml><?xml version="1.0" encoding="utf-8"?>
+<ds:datastoreItem xmlns:ds="http://schemas.openxmlformats.org/officeDocument/2006/customXml" ds:itemID="{84D51D2E-896C-4BD2-8DCE-D63C536AE556}">
+  <ds:schemaRefs>
+    <ds:schemaRef ds:uri="http://schemas.openxmlformats.org/package/2006/metadata/core-properties"/>
+    <ds:schemaRef ds:uri="http://schemas.microsoft.com/office/infopath/2007/PartnerControls"/>
+    <ds:schemaRef ds:uri="http://purl.org/dc/elements/1.1/"/>
+    <ds:schemaRef ds:uri="http://purl.org/dc/dcmitype/"/>
+    <ds:schemaRef ds:uri="http://schemas.microsoft.com/office/2006/documentManagement/types"/>
+    <ds:schemaRef ds:uri="http://www.w3.org/XML/1998/namespace"/>
+    <ds:schemaRef ds:uri="dbda0fc6-3c13-48b8-b10e-930e7a47ceb9"/>
+    <ds:schemaRef ds:uri="http://schemas.microsoft.com/office/2006/metadata/properties"/>
+    <ds:schemaRef ds:uri="http://purl.org/dc/terms/"/>
+  </ds:schemaRefs>
+</ds:datastoreItem>
+</file>
+
 <file path=customXml/itemProps3.xml><?xml version="1.0" encoding="utf-8"?>
 <ds:datastoreItem xmlns:ds="http://schemas.openxmlformats.org/officeDocument/2006/customXml" ds:itemID="{6AE3E7DE-0A90-4123-AEA8-572351C3B59E}">
   <ds:schemaRefs>

</xml_diff>